<commit_message>
Fixed card layout and text sizing
</commit_message>
<xml_diff>
--- a/Delivery_Roadmap_Template_v2.pptx
+++ b/Delivery_Roadmap_Template_v2.pptx
@@ -4462,13 +4462,13 @@
         <p:spPr>
           <a:xfrm>
             <a:off x="457200" y="1188720"/>
-            <a:ext cx="2145731" cy="4572000"/>
+            <a:ext cx="2109155" cy="5084064"/>
           </a:xfrm>
           <a:prstGeom prst="roundRect">
             <a:avLst/>
           </a:prstGeom>
           <a:solidFill>
-            <a:srgbClr val="FFFFFF"/>
+            <a:srgbClr val="E6EEF5"/>
           </a:solidFill>
           <a:ln w="25400">
             <a:solidFill>
@@ -4500,16 +4500,16 @@
       </p:sp>
       <p:sp>
         <p:nvSpPr>
-          <p:cNvPr id="5" name="Rectangle 4"/>
+          <p:cNvPr id="5" name="Rounded Rectangle 4"/>
           <p:cNvSpPr/>
           <p:nvPr/>
         </p:nvSpPr>
         <p:spPr>
           <a:xfrm>
-            <a:off x="457200" y="1188720"/>
-            <a:ext cx="2145731" cy="548640"/>
-          </a:xfrm>
-          <a:prstGeom prst="rect">
+            <a:off x="502920" y="1234440"/>
+            <a:ext cx="2017715" cy="502920"/>
+          </a:xfrm>
+          <a:prstGeom prst="roundRect">
             <a:avLst/>
           </a:prstGeom>
           <a:solidFill>
@@ -4549,8 +4549,8 @@
         </p:nvSpPr>
         <p:spPr>
           <a:xfrm>
-            <a:off x="457200" y="1280160"/>
-            <a:ext cx="2145731" cy="457200"/>
+            <a:off x="457200" y="1298448"/>
+            <a:ext cx="2109155" cy="502920"/>
           </a:xfrm>
           <a:prstGeom prst="rect">
             <a:avLst/>
@@ -4564,41 +4564,109 @@
           <a:lstStyle/>
           <a:p>
             <a:pPr algn="ctr">
-              <a:defRPr sz="1200" b="1">
+              <a:defRPr sz="1300" b="1">
                 <a:solidFill>
                   <a:srgbClr val="FFFFFF"/>
                 </a:solidFill>
               </a:defRPr>
             </a:pPr>
             <a:r>
-              <a:t>PHASE 2a</a:t>
-            </a:r>
-            <a:br/>
-            <a:r>
-              <a:t>2 items</a:t>
-            </a:r>
-          </a:p>
-        </p:txBody>
-      </p:sp>
-      <p:sp>
-        <p:nvSpPr>
-          <p:cNvPr id="7" name="Rectangle 6"/>
+              <a:t>PHASE 2a (2)</a:t>
+            </a:r>
+          </a:p>
+        </p:txBody>
+      </p:sp>
+      <p:sp>
+        <p:nvSpPr>
+          <p:cNvPr id="7" name="TextBox 6"/>
+          <p:cNvSpPr txBox="1"/>
+          <p:nvPr/>
+        </p:nvSpPr>
+        <p:spPr>
+          <a:xfrm>
+            <a:off x="566928" y="1828800"/>
+            <a:ext cx="1889699" cy="347472"/>
+          </a:xfrm>
+          <a:prstGeom prst="rect">
+            <a:avLst/>
+          </a:prstGeom>
+          <a:noFill/>
+        </p:spPr>
+        <p:txBody>
+          <a:bodyPr wrap="square">
+            <a:spAutoFit/>
+          </a:bodyPr>
+          <a:lstStyle/>
+          <a:p>
+            <a:pPr>
+              <a:defRPr sz="800">
+                <a:solidFill>
+                  <a:srgbClr val="1D1D4D"/>
+                </a:solidFill>
+              </a:defRPr>
+            </a:pPr>
+            <a:r>
+              <a:t>MGS-12826: Enhance OLBM document upload...</a:t>
+            </a:r>
+          </a:p>
+        </p:txBody>
+      </p:sp>
+      <p:sp>
+        <p:nvSpPr>
+          <p:cNvPr id="8" name="TextBox 7"/>
+          <p:cNvSpPr txBox="1"/>
+          <p:nvPr/>
+        </p:nvSpPr>
+        <p:spPr>
+          <a:xfrm>
+            <a:off x="566928" y="2176272"/>
+            <a:ext cx="1889699" cy="347472"/>
+          </a:xfrm>
+          <a:prstGeom prst="rect">
+            <a:avLst/>
+          </a:prstGeom>
+          <a:noFill/>
+        </p:spPr>
+        <p:txBody>
+          <a:bodyPr wrap="square">
+            <a:spAutoFit/>
+          </a:bodyPr>
+          <a:lstStyle/>
+          <a:p>
+            <a:pPr>
+              <a:defRPr sz="800">
+                <a:solidFill>
+                  <a:srgbClr val="1D1D4D"/>
+                </a:solidFill>
+              </a:defRPr>
+            </a:pPr>
+            <a:r>
+              <a:t>MGS-12838: Phase 2a - Product fee and LTV...</a:t>
+            </a:r>
+          </a:p>
+        </p:txBody>
+      </p:sp>
+      <p:sp>
+        <p:nvSpPr>
+          <p:cNvPr id="9" name="Rounded Rectangle 8"/>
           <p:cNvSpPr/>
           <p:nvPr/>
         </p:nvSpPr>
         <p:spPr>
           <a:xfrm>
-            <a:off x="502920" y="1828800"/>
-            <a:ext cx="2054291" cy="384048"/>
-          </a:xfrm>
-          <a:prstGeom prst="rect">
+            <a:off x="2749235" y="1188720"/>
+            <a:ext cx="2109155" cy="5084064"/>
+          </a:xfrm>
+          <a:prstGeom prst="roundRect">
             <a:avLst/>
           </a:prstGeom>
           <a:solidFill>
             <a:srgbClr val="E6EEF5"/>
           </a:solidFill>
-          <a:ln>
-            <a:noFill/>
+          <a:ln w="25400">
+            <a:solidFill>
+              <a:srgbClr val="1D1D4D"/>
+            </a:solidFill>
           </a:ln>
         </p:spPr>
         <p:style>
@@ -4625,67 +4693,20 @@
       </p:sp>
       <p:sp>
         <p:nvSpPr>
-          <p:cNvPr id="8" name="TextBox 7"/>
-          <p:cNvSpPr txBox="1"/>
-          <p:nvPr/>
-        </p:nvSpPr>
-        <p:spPr>
-          <a:xfrm>
-            <a:off x="548640" y="1847088"/>
-            <a:ext cx="1962851" cy="384048"/>
-          </a:xfrm>
-          <a:prstGeom prst="rect">
-            <a:avLst/>
-          </a:prstGeom>
-          <a:noFill/>
-        </p:spPr>
-        <p:txBody>
-          <a:bodyPr wrap="square">
-            <a:spAutoFit/>
-          </a:bodyPr>
-          <a:lstStyle/>
-          <a:p>
-            <a:pPr>
-              <a:defRPr sz="900" b="1">
-                <a:solidFill>
-                  <a:srgbClr val="1D1D4D"/>
-                </a:solidFill>
-              </a:defRPr>
-            </a:pPr>
-            <a:r>
-              <a:t>#3 MGS-12826</a:t>
-            </a:r>
-          </a:p>
-          <a:p>
-            <a:pPr>
-              <a:defRPr sz="800">
-                <a:solidFill>
-                  <a:srgbClr val="5C5C7A"/>
-                </a:solidFill>
-              </a:defRPr>
-            </a:pPr>
-            <a:r>
-              <a:t>Enhance OLBM document upload messaging f...</a:t>
-            </a:r>
-          </a:p>
-        </p:txBody>
-      </p:sp>
-      <p:sp>
-        <p:nvSpPr>
-          <p:cNvPr id="9" name="Rectangle 8"/>
+          <p:cNvPr id="10" name="Rounded Rectangle 9"/>
           <p:cNvSpPr/>
           <p:nvPr/>
         </p:nvSpPr>
         <p:spPr>
           <a:xfrm>
-            <a:off x="502920" y="2212848"/>
-            <a:ext cx="2054291" cy="384048"/>
-          </a:xfrm>
-          <a:prstGeom prst="rect">
+            <a:off x="2794955" y="1234440"/>
+            <a:ext cx="2017715" cy="502920"/>
+          </a:xfrm>
+          <a:prstGeom prst="roundRect">
             <a:avLst/>
           </a:prstGeom>
           <a:solidFill>
-            <a:srgbClr val="FFFFFF"/>
+            <a:srgbClr val="1D1D4D"/>
           </a:solidFill>
           <a:ln>
             <a:noFill/>
@@ -4715,14 +4736,49 @@
       </p:sp>
       <p:sp>
         <p:nvSpPr>
-          <p:cNvPr id="10" name="TextBox 9"/>
+          <p:cNvPr id="11" name="TextBox 10"/>
           <p:cNvSpPr txBox="1"/>
           <p:nvPr/>
         </p:nvSpPr>
         <p:spPr>
           <a:xfrm>
-            <a:off x="548640" y="2231136"/>
-            <a:ext cx="1962851" cy="384048"/>
+            <a:off x="2749235" y="1298448"/>
+            <a:ext cx="2109155" cy="502920"/>
+          </a:xfrm>
+          <a:prstGeom prst="rect">
+            <a:avLst/>
+          </a:prstGeom>
+          <a:noFill/>
+        </p:spPr>
+        <p:txBody>
+          <a:bodyPr wrap="none">
+            <a:spAutoFit/>
+          </a:bodyPr>
+          <a:lstStyle/>
+          <a:p>
+            <a:pPr algn="ctr">
+              <a:defRPr sz="1300" b="1">
+                <a:solidFill>
+                  <a:srgbClr val="FFFFFF"/>
+                </a:solidFill>
+              </a:defRPr>
+            </a:pPr>
+            <a:r>
+              <a:t>JUNE (5)</a:t>
+            </a:r>
+          </a:p>
+        </p:txBody>
+      </p:sp>
+      <p:sp>
+        <p:nvSpPr>
+          <p:cNvPr id="12" name="TextBox 11"/>
+          <p:cNvSpPr txBox="1"/>
+          <p:nvPr/>
+        </p:nvSpPr>
+        <p:spPr>
+          <a:xfrm>
+            <a:off x="2858963" y="1828800"/>
+            <a:ext cx="1889699" cy="347472"/>
           </a:xfrm>
           <a:prstGeom prst="rect">
             <a:avLst/>
@@ -4736,46 +4792,174 @@
           <a:lstStyle/>
           <a:p>
             <a:pPr>
-              <a:defRPr sz="900" b="1">
+              <a:defRPr sz="800">
                 <a:solidFill>
                   <a:srgbClr val="1D1D4D"/>
                 </a:solidFill>
               </a:defRPr>
             </a:pPr>
             <a:r>
-              <a:t>#13 MGS-12838</a:t>
-            </a:r>
-          </a:p>
+              <a:t>MGS-12833: Enhance document upload capabilities</a:t>
+            </a:r>
+          </a:p>
+        </p:txBody>
+      </p:sp>
+      <p:sp>
+        <p:nvSpPr>
+          <p:cNvPr id="13" name="TextBox 12"/>
+          <p:cNvSpPr txBox="1"/>
+          <p:nvPr/>
+        </p:nvSpPr>
+        <p:spPr>
+          <a:xfrm>
+            <a:off x="2858963" y="2176272"/>
+            <a:ext cx="1889699" cy="347472"/>
+          </a:xfrm>
+          <a:prstGeom prst="rect">
+            <a:avLst/>
+          </a:prstGeom>
+          <a:noFill/>
+        </p:spPr>
+        <p:txBody>
+          <a:bodyPr wrap="square">
+            <a:spAutoFit/>
+          </a:bodyPr>
+          <a:lstStyle/>
           <a:p>
             <a:pPr>
               <a:defRPr sz="800">
                 <a:solidFill>
-                  <a:srgbClr val="5C5C7A"/>
+                  <a:srgbClr val="1D1D4D"/>
                 </a:solidFill>
               </a:defRPr>
             </a:pPr>
             <a:r>
-              <a:t>Phase 2a - Product fee and LTV Enhanceme...</a:t>
-            </a:r>
-          </a:p>
-        </p:txBody>
-      </p:sp>
-      <p:sp>
-        <p:nvSpPr>
-          <p:cNvPr id="11" name="Rounded Rectangle 10"/>
+              <a:t>MGS-12830: DD Bank validation ESB Service</a:t>
+            </a:r>
+          </a:p>
+        </p:txBody>
+      </p:sp>
+      <p:sp>
+        <p:nvSpPr>
+          <p:cNvPr id="14" name="TextBox 13"/>
+          <p:cNvSpPr txBox="1"/>
+          <p:nvPr/>
+        </p:nvSpPr>
+        <p:spPr>
+          <a:xfrm>
+            <a:off x="2858963" y="2523744"/>
+            <a:ext cx="1889699" cy="347472"/>
+          </a:xfrm>
+          <a:prstGeom prst="rect">
+            <a:avLst/>
+          </a:prstGeom>
+          <a:noFill/>
+        </p:spPr>
+        <p:txBody>
+          <a:bodyPr wrap="square">
+            <a:spAutoFit/>
+          </a:bodyPr>
+          <a:lstStyle/>
+          <a:p>
+            <a:pPr>
+              <a:defRPr sz="800">
+                <a:solidFill>
+                  <a:srgbClr val="1D1D4D"/>
+                </a:solidFill>
+              </a:defRPr>
+            </a:pPr>
+            <a:r>
+              <a:t>MGS-12842: CRA enhancements - June target</a:t>
+            </a:r>
+          </a:p>
+        </p:txBody>
+      </p:sp>
+      <p:sp>
+        <p:nvSpPr>
+          <p:cNvPr id="15" name="TextBox 14"/>
+          <p:cNvSpPr txBox="1"/>
+          <p:nvPr/>
+        </p:nvSpPr>
+        <p:spPr>
+          <a:xfrm>
+            <a:off x="2858963" y="2871216"/>
+            <a:ext cx="1889699" cy="347472"/>
+          </a:xfrm>
+          <a:prstGeom prst="rect">
+            <a:avLst/>
+          </a:prstGeom>
+          <a:noFill/>
+        </p:spPr>
+        <p:txBody>
+          <a:bodyPr wrap="square">
+            <a:spAutoFit/>
+          </a:bodyPr>
+          <a:lstStyle/>
+          <a:p>
+            <a:pPr>
+              <a:defRPr sz="800">
+                <a:solidFill>
+                  <a:srgbClr val="1D1D4D"/>
+                </a:solidFill>
+              </a:defRPr>
+            </a:pPr>
+            <a:r>
+              <a:t>MGS-13102: Prevent Special Characters entered...</a:t>
+            </a:r>
+          </a:p>
+        </p:txBody>
+      </p:sp>
+      <p:sp>
+        <p:nvSpPr>
+          <p:cNvPr id="16" name="TextBox 15"/>
+          <p:cNvSpPr txBox="1"/>
+          <p:nvPr/>
+        </p:nvSpPr>
+        <p:spPr>
+          <a:xfrm>
+            <a:off x="2858963" y="3218688"/>
+            <a:ext cx="1889699" cy="347472"/>
+          </a:xfrm>
+          <a:prstGeom prst="rect">
+            <a:avLst/>
+          </a:prstGeom>
+          <a:noFill/>
+        </p:spPr>
+        <p:txBody>
+          <a:bodyPr wrap="square">
+            <a:spAutoFit/>
+          </a:bodyPr>
+          <a:lstStyle/>
+          <a:p>
+            <a:pPr>
+              <a:defRPr sz="800">
+                <a:solidFill>
+                  <a:srgbClr val="1D1D4D"/>
+                </a:solidFill>
+              </a:defRPr>
+            </a:pPr>
+            <a:r>
+              <a:t>MGS-13079: Remove restriction on CC seeing...</a:t>
+            </a:r>
+          </a:p>
+        </p:txBody>
+      </p:sp>
+      <p:sp>
+        <p:nvSpPr>
+          <p:cNvPr id="17" name="Rounded Rectangle 16"/>
           <p:cNvSpPr/>
           <p:nvPr/>
         </p:nvSpPr>
         <p:spPr>
           <a:xfrm>
-            <a:off x="2740091" y="1188720"/>
-            <a:ext cx="2145731" cy="4572000"/>
+            <a:off x="5041270" y="1188720"/>
+            <a:ext cx="2109155" cy="5084064"/>
           </a:xfrm>
           <a:prstGeom prst="roundRect">
             <a:avLst/>
           </a:prstGeom>
           <a:solidFill>
-            <a:srgbClr val="FFFFFF"/>
+            <a:srgbClr val="E6EEF5"/>
           </a:solidFill>
           <a:ln w="25400">
             <a:solidFill>
@@ -4807,16 +4991,16 @@
       </p:sp>
       <p:sp>
         <p:nvSpPr>
-          <p:cNvPr id="12" name="Rectangle 11"/>
+          <p:cNvPr id="18" name="Rounded Rectangle 17"/>
           <p:cNvSpPr/>
           <p:nvPr/>
         </p:nvSpPr>
         <p:spPr>
           <a:xfrm>
-            <a:off x="2740091" y="1188720"/>
-            <a:ext cx="2145731" cy="548640"/>
-          </a:xfrm>
-          <a:prstGeom prst="rect">
+            <a:off x="5086990" y="1234440"/>
+            <a:ext cx="2017715" cy="502920"/>
+          </a:xfrm>
+          <a:prstGeom prst="roundRect">
             <a:avLst/>
           </a:prstGeom>
           <a:solidFill>
@@ -4850,14 +5034,14 @@
       </p:sp>
       <p:sp>
         <p:nvSpPr>
-          <p:cNvPr id="13" name="TextBox 12"/>
+          <p:cNvPr id="19" name="TextBox 18"/>
           <p:cNvSpPr txBox="1"/>
           <p:nvPr/>
         </p:nvSpPr>
         <p:spPr>
           <a:xfrm>
-            <a:off x="2740091" y="1280160"/>
-            <a:ext cx="2145731" cy="457200"/>
+            <a:off x="5041270" y="1298448"/>
+            <a:ext cx="2109155" cy="502920"/>
           </a:xfrm>
           <a:prstGeom prst="rect">
             <a:avLst/>
@@ -4871,41 +5055,214 @@
           <a:lstStyle/>
           <a:p>
             <a:pPr algn="ctr">
-              <a:defRPr sz="1200" b="1">
+              <a:defRPr sz="1300" b="1">
                 <a:solidFill>
                   <a:srgbClr val="FFFFFF"/>
                 </a:solidFill>
               </a:defRPr>
             </a:pPr>
             <a:r>
-              <a:t>JUNE</a:t>
-            </a:r>
-            <a:br/>
-            <a:r>
-              <a:t>5 items</a:t>
-            </a:r>
-          </a:p>
-        </p:txBody>
-      </p:sp>
-      <p:sp>
-        <p:nvSpPr>
-          <p:cNvPr id="14" name="Rectangle 13"/>
+              <a:t>SEPT (5)</a:t>
+            </a:r>
+          </a:p>
+        </p:txBody>
+      </p:sp>
+      <p:sp>
+        <p:nvSpPr>
+          <p:cNvPr id="20" name="TextBox 19"/>
+          <p:cNvSpPr txBox="1"/>
+          <p:nvPr/>
+        </p:nvSpPr>
+        <p:spPr>
+          <a:xfrm>
+            <a:off x="5150998" y="1828800"/>
+            <a:ext cx="1889699" cy="347472"/>
+          </a:xfrm>
+          <a:prstGeom prst="rect">
+            <a:avLst/>
+          </a:prstGeom>
+          <a:noFill/>
+        </p:spPr>
+        <p:txBody>
+          <a:bodyPr wrap="square">
+            <a:spAutoFit/>
+          </a:bodyPr>
+          <a:lstStyle/>
+          <a:p>
+            <a:pPr>
+              <a:defRPr sz="800">
+                <a:solidFill>
+                  <a:srgbClr val="1D1D4D"/>
+                </a:solidFill>
+              </a:defRPr>
+            </a:pPr>
+            <a:r>
+              <a:t>MGS-13098: Increase levels of robot validation</a:t>
+            </a:r>
+          </a:p>
+        </p:txBody>
+      </p:sp>
+      <p:sp>
+        <p:nvSpPr>
+          <p:cNvPr id="21" name="TextBox 20"/>
+          <p:cNvSpPr txBox="1"/>
+          <p:nvPr/>
+        </p:nvSpPr>
+        <p:spPr>
+          <a:xfrm>
+            <a:off x="5150998" y="2176272"/>
+            <a:ext cx="1889699" cy="347472"/>
+          </a:xfrm>
+          <a:prstGeom prst="rect">
+            <a:avLst/>
+          </a:prstGeom>
+          <a:noFill/>
+        </p:spPr>
+        <p:txBody>
+          <a:bodyPr wrap="square">
+            <a:spAutoFit/>
+          </a:bodyPr>
+          <a:lstStyle/>
+          <a:p>
+            <a:pPr>
+              <a:defRPr sz="800">
+                <a:solidFill>
+                  <a:srgbClr val="1D1D4D"/>
+                </a:solidFill>
+              </a:defRPr>
+            </a:pPr>
+            <a:r>
+              <a:t>MGS-13105: Robot to park data entry exceptions...</a:t>
+            </a:r>
+          </a:p>
+        </p:txBody>
+      </p:sp>
+      <p:sp>
+        <p:nvSpPr>
+          <p:cNvPr id="22" name="TextBox 21"/>
+          <p:cNvSpPr txBox="1"/>
+          <p:nvPr/>
+        </p:nvSpPr>
+        <p:spPr>
+          <a:xfrm>
+            <a:off x="5150998" y="2523744"/>
+            <a:ext cx="1889699" cy="347472"/>
+          </a:xfrm>
+          <a:prstGeom prst="rect">
+            <a:avLst/>
+          </a:prstGeom>
+          <a:noFill/>
+        </p:spPr>
+        <p:txBody>
+          <a:bodyPr wrap="square">
+            <a:spAutoFit/>
+          </a:bodyPr>
+          <a:lstStyle/>
+          <a:p>
+            <a:pPr>
+              <a:defRPr sz="800">
+                <a:solidFill>
+                  <a:srgbClr val="1D1D4D"/>
+                </a:solidFill>
+              </a:defRPr>
+            </a:pPr>
+            <a:r>
+              <a:t>MGS-13077: Remove restriction on BDM seeing...</a:t>
+            </a:r>
+          </a:p>
+        </p:txBody>
+      </p:sp>
+      <p:sp>
+        <p:nvSpPr>
+          <p:cNvPr id="23" name="TextBox 22"/>
+          <p:cNvSpPr txBox="1"/>
+          <p:nvPr/>
+        </p:nvSpPr>
+        <p:spPr>
+          <a:xfrm>
+            <a:off x="5150998" y="2871216"/>
+            <a:ext cx="1889699" cy="347472"/>
+          </a:xfrm>
+          <a:prstGeom prst="rect">
+            <a:avLst/>
+          </a:prstGeom>
+          <a:noFill/>
+        </p:spPr>
+        <p:txBody>
+          <a:bodyPr wrap="square">
+            <a:spAutoFit/>
+          </a:bodyPr>
+          <a:lstStyle/>
+          <a:p>
+            <a:pPr>
+              <a:defRPr sz="800">
+                <a:solidFill>
+                  <a:srgbClr val="1D1D4D"/>
+                </a:solidFill>
+              </a:defRPr>
+            </a:pPr>
+            <a:r>
+              <a:t>MGS-13070: Make case status visible in Case...</a:t>
+            </a:r>
+          </a:p>
+        </p:txBody>
+      </p:sp>
+      <p:sp>
+        <p:nvSpPr>
+          <p:cNvPr id="24" name="TextBox 23"/>
+          <p:cNvSpPr txBox="1"/>
+          <p:nvPr/>
+        </p:nvSpPr>
+        <p:spPr>
+          <a:xfrm>
+            <a:off x="5150998" y="3218688"/>
+            <a:ext cx="1889699" cy="347472"/>
+          </a:xfrm>
+          <a:prstGeom prst="rect">
+            <a:avLst/>
+          </a:prstGeom>
+          <a:noFill/>
+        </p:spPr>
+        <p:txBody>
+          <a:bodyPr wrap="square">
+            <a:spAutoFit/>
+          </a:bodyPr>
+          <a:lstStyle/>
+          <a:p>
+            <a:pPr>
+              <a:defRPr sz="800">
+                <a:solidFill>
+                  <a:srgbClr val="1D1D4D"/>
+                </a:solidFill>
+              </a:defRPr>
+            </a:pPr>
+            <a:r>
+              <a:t>MGS-12827: Remove Valuation Visibility...</a:t>
+            </a:r>
+          </a:p>
+        </p:txBody>
+      </p:sp>
+      <p:sp>
+        <p:nvSpPr>
+          <p:cNvPr id="25" name="Rounded Rectangle 24"/>
           <p:cNvSpPr/>
           <p:nvPr/>
         </p:nvSpPr>
         <p:spPr>
           <a:xfrm>
-            <a:off x="2785811" y="1828800"/>
-            <a:ext cx="2054291" cy="384048"/>
-          </a:xfrm>
-          <a:prstGeom prst="rect">
+            <a:off x="7333305" y="1188720"/>
+            <a:ext cx="2109155" cy="5084064"/>
+          </a:xfrm>
+          <a:prstGeom prst="roundRect">
             <a:avLst/>
           </a:prstGeom>
           <a:solidFill>
             <a:srgbClr val="E6EEF5"/>
           </a:solidFill>
-          <a:ln>
-            <a:noFill/>
+          <a:ln w="25400">
+            <a:solidFill>
+              <a:srgbClr val="1D1D4D"/>
+            </a:solidFill>
           </a:ln>
         </p:spPr>
         <p:style>
@@ -4932,67 +5289,20 @@
       </p:sp>
       <p:sp>
         <p:nvSpPr>
-          <p:cNvPr id="15" name="TextBox 14"/>
-          <p:cNvSpPr txBox="1"/>
-          <p:nvPr/>
-        </p:nvSpPr>
-        <p:spPr>
-          <a:xfrm>
-            <a:off x="2831531" y="1847088"/>
-            <a:ext cx="1962851" cy="384048"/>
-          </a:xfrm>
-          <a:prstGeom prst="rect">
-            <a:avLst/>
-          </a:prstGeom>
-          <a:noFill/>
-        </p:spPr>
-        <p:txBody>
-          <a:bodyPr wrap="square">
-            <a:spAutoFit/>
-          </a:bodyPr>
-          <a:lstStyle/>
-          <a:p>
-            <a:pPr>
-              <a:defRPr sz="900" b="1">
-                <a:solidFill>
-                  <a:srgbClr val="1D1D4D"/>
-                </a:solidFill>
-              </a:defRPr>
-            </a:pPr>
-            <a:r>
-              <a:t>#7 MGS-12833</a:t>
-            </a:r>
-          </a:p>
-          <a:p>
-            <a:pPr>
-              <a:defRPr sz="800">
-                <a:solidFill>
-                  <a:srgbClr val="5C5C7A"/>
-                </a:solidFill>
-              </a:defRPr>
-            </a:pPr>
-            <a:r>
-              <a:t>Enhance document upload capabilities</a:t>
-            </a:r>
-          </a:p>
-        </p:txBody>
-      </p:sp>
-      <p:sp>
-        <p:nvSpPr>
-          <p:cNvPr id="16" name="Rectangle 15"/>
+          <p:cNvPr id="26" name="Rounded Rectangle 25"/>
           <p:cNvSpPr/>
           <p:nvPr/>
         </p:nvSpPr>
         <p:spPr>
           <a:xfrm>
-            <a:off x="2785811" y="2212848"/>
-            <a:ext cx="2054291" cy="384048"/>
-          </a:xfrm>
-          <a:prstGeom prst="rect">
+            <a:off x="7379025" y="1234440"/>
+            <a:ext cx="2017715" cy="502920"/>
+          </a:xfrm>
+          <a:prstGeom prst="roundRect">
             <a:avLst/>
           </a:prstGeom>
           <a:solidFill>
-            <a:srgbClr val="FFFFFF"/>
+            <a:srgbClr val="1D1D4D"/>
           </a:solidFill>
           <a:ln>
             <a:noFill/>
@@ -5022,14 +5332,49 @@
       </p:sp>
       <p:sp>
         <p:nvSpPr>
-          <p:cNvPr id="17" name="TextBox 16"/>
+          <p:cNvPr id="27" name="TextBox 26"/>
           <p:cNvSpPr txBox="1"/>
           <p:nvPr/>
         </p:nvSpPr>
         <p:spPr>
           <a:xfrm>
-            <a:off x="2831531" y="2231136"/>
-            <a:ext cx="1962851" cy="384048"/>
+            <a:off x="7333305" y="1298448"/>
+            <a:ext cx="2109155" cy="502920"/>
+          </a:xfrm>
+          <a:prstGeom prst="rect">
+            <a:avLst/>
+          </a:prstGeom>
+          <a:noFill/>
+        </p:spPr>
+        <p:txBody>
+          <a:bodyPr wrap="none">
+            <a:spAutoFit/>
+          </a:bodyPr>
+          <a:lstStyle/>
+          <a:p>
+            <a:pPr algn="ctr">
+              <a:defRPr sz="1300" b="1">
+                <a:solidFill>
+                  <a:srgbClr val="FFFFFF"/>
+                </a:solidFill>
+              </a:defRPr>
+            </a:pPr>
+            <a:r>
+              <a:t>NOV (2)</a:t>
+            </a:r>
+          </a:p>
+        </p:txBody>
+      </p:sp>
+      <p:sp>
+        <p:nvSpPr>
+          <p:cNvPr id="28" name="TextBox 27"/>
+          <p:cNvSpPr txBox="1"/>
+          <p:nvPr/>
+        </p:nvSpPr>
+        <p:spPr>
+          <a:xfrm>
+            <a:off x="7443033" y="1828800"/>
+            <a:ext cx="1889699" cy="347472"/>
           </a:xfrm>
           <a:prstGeom prst="rect">
             <a:avLst/>
@@ -5043,49 +5388,74 @@
           <a:lstStyle/>
           <a:p>
             <a:pPr>
-              <a:defRPr sz="900" b="1">
+              <a:defRPr sz="800">
                 <a:solidFill>
                   <a:srgbClr val="1D1D4D"/>
                 </a:solidFill>
               </a:defRPr>
             </a:pPr>
             <a:r>
-              <a:t>#16 MGS-12830</a:t>
-            </a:r>
-          </a:p>
+              <a:t>MGS-12832: Existing Customer Online Application</a:t>
+            </a:r>
+          </a:p>
+        </p:txBody>
+      </p:sp>
+      <p:sp>
+        <p:nvSpPr>
+          <p:cNvPr id="29" name="TextBox 28"/>
+          <p:cNvSpPr txBox="1"/>
+          <p:nvPr/>
+        </p:nvSpPr>
+        <p:spPr>
+          <a:xfrm>
+            <a:off x="7443033" y="2176272"/>
+            <a:ext cx="1889699" cy="347472"/>
+          </a:xfrm>
+          <a:prstGeom prst="rect">
+            <a:avLst/>
+          </a:prstGeom>
+          <a:noFill/>
+        </p:spPr>
+        <p:txBody>
+          <a:bodyPr wrap="square">
+            <a:spAutoFit/>
+          </a:bodyPr>
+          <a:lstStyle/>
           <a:p>
             <a:pPr>
               <a:defRPr sz="800">
                 <a:solidFill>
-                  <a:srgbClr val="5C5C7A"/>
+                  <a:srgbClr val="1D1D4D"/>
                 </a:solidFill>
               </a:defRPr>
             </a:pPr>
             <a:r>
-              <a:t>DD Bank validation ESB Service</a:t>
-            </a:r>
-          </a:p>
-        </p:txBody>
-      </p:sp>
-      <p:sp>
-        <p:nvSpPr>
-          <p:cNvPr id="18" name="Rectangle 17"/>
+              <a:t>MGS-12831: Worldpay to Global Pay</a:t>
+            </a:r>
+          </a:p>
+        </p:txBody>
+      </p:sp>
+      <p:sp>
+        <p:nvSpPr>
+          <p:cNvPr id="30" name="Rounded Rectangle 29"/>
           <p:cNvSpPr/>
           <p:nvPr/>
         </p:nvSpPr>
         <p:spPr>
           <a:xfrm>
-            <a:off x="2785811" y="2596896"/>
-            <a:ext cx="2054291" cy="384048"/>
-          </a:xfrm>
-          <a:prstGeom prst="rect">
+            <a:off x="9625340" y="1188720"/>
+            <a:ext cx="2109155" cy="5084064"/>
+          </a:xfrm>
+          <a:prstGeom prst="roundRect">
             <a:avLst/>
           </a:prstGeom>
           <a:solidFill>
             <a:srgbClr val="E6EEF5"/>
           </a:solidFill>
-          <a:ln>
-            <a:noFill/>
+          <a:ln w="25400">
+            <a:solidFill>
+              <a:srgbClr val="1D1D4D"/>
+            </a:solidFill>
           </a:ln>
         </p:spPr>
         <p:style>
@@ -5112,67 +5482,20 @@
       </p:sp>
       <p:sp>
         <p:nvSpPr>
-          <p:cNvPr id="19" name="TextBox 18"/>
-          <p:cNvSpPr txBox="1"/>
-          <p:nvPr/>
-        </p:nvSpPr>
-        <p:spPr>
-          <a:xfrm>
-            <a:off x="2831531" y="2615184"/>
-            <a:ext cx="1962851" cy="384048"/>
-          </a:xfrm>
-          <a:prstGeom prst="rect">
-            <a:avLst/>
-          </a:prstGeom>
-          <a:noFill/>
-        </p:spPr>
-        <p:txBody>
-          <a:bodyPr wrap="square">
-            <a:spAutoFit/>
-          </a:bodyPr>
-          <a:lstStyle/>
-          <a:p>
-            <a:pPr>
-              <a:defRPr sz="900" b="1">
-                <a:solidFill>
-                  <a:srgbClr val="1D1D4D"/>
-                </a:solidFill>
-              </a:defRPr>
-            </a:pPr>
-            <a:r>
-              <a:t>#24 MGS-12842</a:t>
-            </a:r>
-          </a:p>
-          <a:p>
-            <a:pPr>
-              <a:defRPr sz="800">
-                <a:solidFill>
-                  <a:srgbClr val="5C5C7A"/>
-                </a:solidFill>
-              </a:defRPr>
-            </a:pPr>
-            <a:r>
-              <a:t>CRA enhancements - June target</a:t>
-            </a:r>
-          </a:p>
-        </p:txBody>
-      </p:sp>
-      <p:sp>
-        <p:nvSpPr>
-          <p:cNvPr id="20" name="Rectangle 19"/>
+          <p:cNvPr id="31" name="Rounded Rectangle 30"/>
           <p:cNvSpPr/>
           <p:nvPr/>
         </p:nvSpPr>
         <p:spPr>
           <a:xfrm>
-            <a:off x="2785811" y="2980944"/>
-            <a:ext cx="2054291" cy="384048"/>
-          </a:xfrm>
-          <a:prstGeom prst="rect">
+            <a:off x="9671060" y="1234440"/>
+            <a:ext cx="2017715" cy="502920"/>
+          </a:xfrm>
+          <a:prstGeom prst="roundRect">
             <a:avLst/>
           </a:prstGeom>
           <a:solidFill>
-            <a:srgbClr val="FFFFFF"/>
+            <a:srgbClr val="1D1D4D"/>
           </a:solidFill>
           <a:ln>
             <a:noFill/>
@@ -5202,14 +5525,49 @@
       </p:sp>
       <p:sp>
         <p:nvSpPr>
-          <p:cNvPr id="21" name="TextBox 20"/>
+          <p:cNvPr id="32" name="TextBox 31"/>
           <p:cNvSpPr txBox="1"/>
           <p:nvPr/>
         </p:nvSpPr>
         <p:spPr>
           <a:xfrm>
-            <a:off x="2831531" y="2999232"/>
-            <a:ext cx="1962851" cy="384048"/>
+            <a:off x="9625340" y="1298448"/>
+            <a:ext cx="2109155" cy="502920"/>
+          </a:xfrm>
+          <a:prstGeom prst="rect">
+            <a:avLst/>
+          </a:prstGeom>
+          <a:noFill/>
+        </p:spPr>
+        <p:txBody>
+          <a:bodyPr wrap="none">
+            <a:spAutoFit/>
+          </a:bodyPr>
+          <a:lstStyle/>
+          <a:p>
+            <a:pPr algn="ctr">
+              <a:defRPr sz="1300" b="1">
+                <a:solidFill>
+                  <a:srgbClr val="FFFFFF"/>
+                </a:solidFill>
+              </a:defRPr>
+            </a:pPr>
+            <a:r>
+              <a:t>MAR 2027 (19)</a:t>
+            </a:r>
+          </a:p>
+        </p:txBody>
+      </p:sp>
+      <p:sp>
+        <p:nvSpPr>
+          <p:cNvPr id="33" name="TextBox 32"/>
+          <p:cNvSpPr txBox="1"/>
+          <p:nvPr/>
+        </p:nvSpPr>
+        <p:spPr>
+          <a:xfrm>
+            <a:off x="9735068" y="1828800"/>
+            <a:ext cx="1889699" cy="347472"/>
           </a:xfrm>
           <a:prstGeom prst="rect">
             <a:avLst/>
@@ -5223,2062 +5581,434 @@
           <a:lstStyle/>
           <a:p>
             <a:pPr>
-              <a:defRPr sz="900" b="1">
+              <a:defRPr sz="800">
                 <a:solidFill>
                   <a:srgbClr val="1D1D4D"/>
                 </a:solidFill>
               </a:defRPr>
             </a:pPr>
             <a:r>
-              <a:t>#33 MGS-13102</a:t>
-            </a:r>
-          </a:p>
+              <a:t>MGS-13067: Create new fields to identify...</a:t>
+            </a:r>
+          </a:p>
+        </p:txBody>
+      </p:sp>
+      <p:sp>
+        <p:nvSpPr>
+          <p:cNvPr id="34" name="TextBox 33"/>
+          <p:cNvSpPr txBox="1"/>
+          <p:nvPr/>
+        </p:nvSpPr>
+        <p:spPr>
+          <a:xfrm>
+            <a:off x="9735068" y="2176272"/>
+            <a:ext cx="1889699" cy="347472"/>
+          </a:xfrm>
+          <a:prstGeom prst="rect">
+            <a:avLst/>
+          </a:prstGeom>
+          <a:noFill/>
+        </p:spPr>
+        <p:txBody>
+          <a:bodyPr wrap="square">
+            <a:spAutoFit/>
+          </a:bodyPr>
+          <a:lstStyle/>
           <a:p>
             <a:pPr>
               <a:defRPr sz="800">
+                <a:solidFill>
+                  <a:srgbClr val="1D1D4D"/>
+                </a:solidFill>
+              </a:defRPr>
+            </a:pPr>
+            <a:r>
+              <a:t>MGS-13066: Create Variable Income fields and...</a:t>
+            </a:r>
+          </a:p>
+        </p:txBody>
+      </p:sp>
+      <p:sp>
+        <p:nvSpPr>
+          <p:cNvPr id="35" name="TextBox 34"/>
+          <p:cNvSpPr txBox="1"/>
+          <p:nvPr/>
+        </p:nvSpPr>
+        <p:spPr>
+          <a:xfrm>
+            <a:off x="9735068" y="2523744"/>
+            <a:ext cx="1889699" cy="347472"/>
+          </a:xfrm>
+          <a:prstGeom prst="rect">
+            <a:avLst/>
+          </a:prstGeom>
+          <a:noFill/>
+        </p:spPr>
+        <p:txBody>
+          <a:bodyPr wrap="square">
+            <a:spAutoFit/>
+          </a:bodyPr>
+          <a:lstStyle/>
+          <a:p>
+            <a:pPr>
+              <a:defRPr sz="800">
+                <a:solidFill>
+                  <a:srgbClr val="1D1D4D"/>
+                </a:solidFill>
+              </a:defRPr>
+            </a:pPr>
+            <a:r>
+              <a:t>MGS-13062: Create new fields for Joint...</a:t>
+            </a:r>
+          </a:p>
+        </p:txBody>
+      </p:sp>
+      <p:sp>
+        <p:nvSpPr>
+          <p:cNvPr id="36" name="TextBox 35"/>
+          <p:cNvSpPr txBox="1"/>
+          <p:nvPr/>
+        </p:nvSpPr>
+        <p:spPr>
+          <a:xfrm>
+            <a:off x="9735068" y="2871216"/>
+            <a:ext cx="1889699" cy="347472"/>
+          </a:xfrm>
+          <a:prstGeom prst="rect">
+            <a:avLst/>
+          </a:prstGeom>
+          <a:noFill/>
+        </p:spPr>
+        <p:txBody>
+          <a:bodyPr wrap="square">
+            <a:spAutoFit/>
+          </a:bodyPr>
+          <a:lstStyle/>
+          <a:p>
+            <a:pPr>
+              <a:defRPr sz="800">
+                <a:solidFill>
+                  <a:srgbClr val="1D1D4D"/>
+                </a:solidFill>
+              </a:defRPr>
+            </a:pPr>
+            <a:r>
+              <a:t>MGS-13063: Create additional fields for Self...</a:t>
+            </a:r>
+          </a:p>
+        </p:txBody>
+      </p:sp>
+      <p:sp>
+        <p:nvSpPr>
+          <p:cNvPr id="37" name="TextBox 36"/>
+          <p:cNvSpPr txBox="1"/>
+          <p:nvPr/>
+        </p:nvSpPr>
+        <p:spPr>
+          <a:xfrm>
+            <a:off x="9735068" y="3218688"/>
+            <a:ext cx="1889699" cy="347472"/>
+          </a:xfrm>
+          <a:prstGeom prst="rect">
+            <a:avLst/>
+          </a:prstGeom>
+          <a:noFill/>
+        </p:spPr>
+        <p:txBody>
+          <a:bodyPr wrap="square">
+            <a:spAutoFit/>
+          </a:bodyPr>
+          <a:lstStyle/>
+          <a:p>
+            <a:pPr>
+              <a:defRPr sz="800">
+                <a:solidFill>
+                  <a:srgbClr val="1D1D4D"/>
+                </a:solidFill>
+              </a:defRPr>
+            </a:pPr>
+            <a:r>
+              <a:t>MGS-12823: Create Secondary Income fields and...</a:t>
+            </a:r>
+          </a:p>
+        </p:txBody>
+      </p:sp>
+      <p:sp>
+        <p:nvSpPr>
+          <p:cNvPr id="38" name="TextBox 37"/>
+          <p:cNvSpPr txBox="1"/>
+          <p:nvPr/>
+        </p:nvSpPr>
+        <p:spPr>
+          <a:xfrm>
+            <a:off x="9735068" y="3566160"/>
+            <a:ext cx="1889699" cy="347472"/>
+          </a:xfrm>
+          <a:prstGeom prst="rect">
+            <a:avLst/>
+          </a:prstGeom>
+          <a:noFill/>
+        </p:spPr>
+        <p:txBody>
+          <a:bodyPr wrap="square">
+            <a:spAutoFit/>
+          </a:bodyPr>
+          <a:lstStyle/>
+          <a:p>
+            <a:pPr>
+              <a:defRPr sz="800">
+                <a:solidFill>
+                  <a:srgbClr val="1D1D4D"/>
+                </a:solidFill>
+              </a:defRPr>
+            </a:pPr>
+            <a:r>
+              <a:t>MGS-13096: Improve clarity of messages in...</a:t>
+            </a:r>
+          </a:p>
+        </p:txBody>
+      </p:sp>
+      <p:sp>
+        <p:nvSpPr>
+          <p:cNvPr id="39" name="TextBox 38"/>
+          <p:cNvSpPr txBox="1"/>
+          <p:nvPr/>
+        </p:nvSpPr>
+        <p:spPr>
+          <a:xfrm>
+            <a:off x="9735068" y="3913632"/>
+            <a:ext cx="1889699" cy="347472"/>
+          </a:xfrm>
+          <a:prstGeom prst="rect">
+            <a:avLst/>
+          </a:prstGeom>
+          <a:noFill/>
+        </p:spPr>
+        <p:txBody>
+          <a:bodyPr wrap="square">
+            <a:spAutoFit/>
+          </a:bodyPr>
+          <a:lstStyle/>
+          <a:p>
+            <a:pPr>
+              <a:defRPr sz="800">
+                <a:solidFill>
+                  <a:srgbClr val="1D1D4D"/>
+                </a:solidFill>
+              </a:defRPr>
+            </a:pPr>
+            <a:r>
+              <a:t>MGS-12841: Replacement Mortgage Illustrator...</a:t>
+            </a:r>
+          </a:p>
+        </p:txBody>
+      </p:sp>
+      <p:sp>
+        <p:nvSpPr>
+          <p:cNvPr id="40" name="TextBox 39"/>
+          <p:cNvSpPr txBox="1"/>
+          <p:nvPr/>
+        </p:nvSpPr>
+        <p:spPr>
+          <a:xfrm>
+            <a:off x="9735068" y="4261104"/>
+            <a:ext cx="1889699" cy="347472"/>
+          </a:xfrm>
+          <a:prstGeom prst="rect">
+            <a:avLst/>
+          </a:prstGeom>
+          <a:noFill/>
+        </p:spPr>
+        <p:txBody>
+          <a:bodyPr wrap="square">
+            <a:spAutoFit/>
+          </a:bodyPr>
+          <a:lstStyle/>
+          <a:p>
+            <a:pPr>
+              <a:defRPr sz="800">
+                <a:solidFill>
+                  <a:srgbClr val="1D1D4D"/>
+                </a:solidFill>
+              </a:defRPr>
+            </a:pPr>
+            <a:r>
+              <a:t>MGS-13092: Add date of valuation to MAP chaser...</a:t>
+            </a:r>
+          </a:p>
+        </p:txBody>
+      </p:sp>
+      <p:sp>
+        <p:nvSpPr>
+          <p:cNvPr id="41" name="TextBox 40"/>
+          <p:cNvSpPr txBox="1"/>
+          <p:nvPr/>
+        </p:nvSpPr>
+        <p:spPr>
+          <a:xfrm>
+            <a:off x="9735068" y="4608576"/>
+            <a:ext cx="1889699" cy="347472"/>
+          </a:xfrm>
+          <a:prstGeom prst="rect">
+            <a:avLst/>
+          </a:prstGeom>
+          <a:noFill/>
+        </p:spPr>
+        <p:txBody>
+          <a:bodyPr wrap="square">
+            <a:spAutoFit/>
+          </a:bodyPr>
+          <a:lstStyle/>
+          <a:p>
+            <a:pPr>
+              <a:defRPr sz="800">
+                <a:solidFill>
+                  <a:srgbClr val="1D1D4D"/>
+                </a:solidFill>
+              </a:defRPr>
+            </a:pPr>
+            <a:r>
+              <a:t>MGS-13086: Improve MAP email templates</a:t>
+            </a:r>
+          </a:p>
+        </p:txBody>
+      </p:sp>
+      <p:sp>
+        <p:nvSpPr>
+          <p:cNvPr id="42" name="TextBox 41"/>
+          <p:cNvSpPr txBox="1"/>
+          <p:nvPr/>
+        </p:nvSpPr>
+        <p:spPr>
+          <a:xfrm>
+            <a:off x="9735068" y="4956048"/>
+            <a:ext cx="1889699" cy="347472"/>
+          </a:xfrm>
+          <a:prstGeom prst="rect">
+            <a:avLst/>
+          </a:prstGeom>
+          <a:noFill/>
+        </p:spPr>
+        <p:txBody>
+          <a:bodyPr wrap="square">
+            <a:spAutoFit/>
+          </a:bodyPr>
+          <a:lstStyle/>
+          <a:p>
+            <a:pPr>
+              <a:defRPr sz="800">
+                <a:solidFill>
+                  <a:srgbClr val="1D1D4D"/>
+                </a:solidFill>
+              </a:defRPr>
+            </a:pPr>
+            <a:r>
+              <a:t>MGS-13083: Improve wording of MAP chaser emails</a:t>
+            </a:r>
+          </a:p>
+        </p:txBody>
+      </p:sp>
+      <p:sp>
+        <p:nvSpPr>
+          <p:cNvPr id="43" name="TextBox 42"/>
+          <p:cNvSpPr txBox="1"/>
+          <p:nvPr/>
+        </p:nvSpPr>
+        <p:spPr>
+          <a:xfrm>
+            <a:off x="9735068" y="5303520"/>
+            <a:ext cx="1889699" cy="347472"/>
+          </a:xfrm>
+          <a:prstGeom prst="rect">
+            <a:avLst/>
+          </a:prstGeom>
+          <a:noFill/>
+        </p:spPr>
+        <p:txBody>
+          <a:bodyPr wrap="square">
+            <a:spAutoFit/>
+          </a:bodyPr>
+          <a:lstStyle/>
+          <a:p>
+            <a:pPr>
+              <a:defRPr sz="800">
+                <a:solidFill>
+                  <a:srgbClr val="1D1D4D"/>
+                </a:solidFill>
+              </a:defRPr>
+            </a:pPr>
+            <a:r>
+              <a:t>MGS-13073: Make offer status and timescales...</a:t>
+            </a:r>
+          </a:p>
+        </p:txBody>
+      </p:sp>
+      <p:sp>
+        <p:nvSpPr>
+          <p:cNvPr id="44" name="TextBox 43"/>
+          <p:cNvSpPr txBox="1"/>
+          <p:nvPr/>
+        </p:nvSpPr>
+        <p:spPr>
+          <a:xfrm>
+            <a:off x="9735068" y="5650992"/>
+            <a:ext cx="1889699" cy="347472"/>
+          </a:xfrm>
+          <a:prstGeom prst="rect">
+            <a:avLst/>
+          </a:prstGeom>
+          <a:noFill/>
+        </p:spPr>
+        <p:txBody>
+          <a:bodyPr wrap="square">
+            <a:spAutoFit/>
+          </a:bodyPr>
+          <a:lstStyle/>
+          <a:p>
+            <a:pPr>
+              <a:defRPr sz="800">
+                <a:solidFill>
+                  <a:srgbClr val="1D1D4D"/>
+                </a:solidFill>
+              </a:defRPr>
+            </a:pPr>
+            <a:r>
+              <a:t>MGS-12839: Reduce AIP Queries to Underwriters</a:t>
+            </a:r>
+          </a:p>
+        </p:txBody>
+      </p:sp>
+      <p:sp>
+        <p:nvSpPr>
+          <p:cNvPr id="45" name="TextBox 44"/>
+          <p:cNvSpPr txBox="1"/>
+          <p:nvPr/>
+        </p:nvSpPr>
+        <p:spPr>
+          <a:xfrm>
+            <a:off x="9625340" y="5998464"/>
+            <a:ext cx="2109155" cy="228600"/>
+          </a:xfrm>
+          <a:prstGeom prst="rect">
+            <a:avLst/>
+          </a:prstGeom>
+          <a:noFill/>
+        </p:spPr>
+        <p:txBody>
+          <a:bodyPr wrap="none">
+            <a:spAutoFit/>
+          </a:bodyPr>
+          <a:lstStyle/>
+          <a:p>
+            <a:pPr algn="ctr">
+              <a:defRPr sz="800" i="1">
                 <a:solidFill>
                   <a:srgbClr val="5C5C7A"/>
                 </a:solidFill>
               </a:defRPr>
             </a:pPr>
             <a:r>
-              <a:t>Prevent Special Characters entered in OL...</a:t>
-            </a:r>
-          </a:p>
-        </p:txBody>
-      </p:sp>
-      <p:sp>
-        <p:nvSpPr>
-          <p:cNvPr id="22" name="Rectangle 21"/>
-          <p:cNvSpPr/>
-          <p:nvPr/>
-        </p:nvSpPr>
-        <p:spPr>
-          <a:xfrm>
-            <a:off x="2785811" y="3364992"/>
-            <a:ext cx="2054291" cy="384048"/>
-          </a:xfrm>
-          <a:prstGeom prst="rect">
-            <a:avLst/>
-          </a:prstGeom>
-          <a:solidFill>
-            <a:srgbClr val="E6EEF5"/>
-          </a:solidFill>
-          <a:ln>
-            <a:noFill/>
-          </a:ln>
-        </p:spPr>
-        <p:style>
-          <a:lnRef idx="1">
-            <a:schemeClr val="accent1"/>
-          </a:lnRef>
-          <a:fillRef idx="3">
-            <a:schemeClr val="accent1"/>
-          </a:fillRef>
-          <a:effectRef idx="2">
-            <a:schemeClr val="accent1"/>
-          </a:effectRef>
-          <a:fontRef idx="minor">
-            <a:schemeClr val="lt1"/>
-          </a:fontRef>
-        </p:style>
-        <p:txBody>
-          <a:bodyPr rtlCol="0" anchor="ctr"/>
-          <a:lstStyle/>
-          <a:p>
-            <a:pPr algn="ctr"/>
-          </a:p>
-        </p:txBody>
-      </p:sp>
-      <p:sp>
-        <p:nvSpPr>
-          <p:cNvPr id="23" name="TextBox 22"/>
-          <p:cNvSpPr txBox="1"/>
-          <p:nvPr/>
-        </p:nvSpPr>
-        <p:spPr>
-          <a:xfrm>
-            <a:off x="2831531" y="3383280"/>
-            <a:ext cx="1962851" cy="384048"/>
-          </a:xfrm>
-          <a:prstGeom prst="rect">
-            <a:avLst/>
-          </a:prstGeom>
-          <a:noFill/>
-        </p:spPr>
-        <p:txBody>
-          <a:bodyPr wrap="square">
-            <a:spAutoFit/>
-          </a:bodyPr>
-          <a:lstStyle/>
-          <a:p>
-            <a:pPr>
-              <a:defRPr sz="900" b="1">
-                <a:solidFill>
-                  <a:srgbClr val="1D1D4D"/>
-                </a:solidFill>
-              </a:defRPr>
-            </a:pPr>
-            <a:r>
-              <a:t>#34 MGS-13079</a:t>
-            </a:r>
-          </a:p>
-          <a:p>
-            <a:pPr>
-              <a:defRPr sz="800">
-                <a:solidFill>
-                  <a:srgbClr val="5C5C7A"/>
-                </a:solidFill>
-              </a:defRPr>
-            </a:pPr>
-            <a:r>
-              <a:t>Remove restriction on CC seeing property...</a:t>
-            </a:r>
-          </a:p>
-        </p:txBody>
-      </p:sp>
-      <p:sp>
-        <p:nvSpPr>
-          <p:cNvPr id="24" name="Rounded Rectangle 23"/>
-          <p:cNvSpPr/>
-          <p:nvPr/>
-        </p:nvSpPr>
-        <p:spPr>
-          <a:xfrm>
-            <a:off x="5022982" y="1188720"/>
-            <a:ext cx="2145731" cy="4572000"/>
-          </a:xfrm>
-          <a:prstGeom prst="roundRect">
-            <a:avLst/>
-          </a:prstGeom>
-          <a:solidFill>
-            <a:srgbClr val="FFFFFF"/>
-          </a:solidFill>
-          <a:ln w="25400">
-            <a:solidFill>
-              <a:srgbClr val="1D1D4D"/>
-            </a:solidFill>
-          </a:ln>
-        </p:spPr>
-        <p:style>
-          <a:lnRef idx="1">
-            <a:schemeClr val="accent1"/>
-          </a:lnRef>
-          <a:fillRef idx="3">
-            <a:schemeClr val="accent1"/>
-          </a:fillRef>
-          <a:effectRef idx="2">
-            <a:schemeClr val="accent1"/>
-          </a:effectRef>
-          <a:fontRef idx="minor">
-            <a:schemeClr val="lt1"/>
-          </a:fontRef>
-        </p:style>
-        <p:txBody>
-          <a:bodyPr rtlCol="0" anchor="ctr"/>
-          <a:lstStyle/>
-          <a:p>
-            <a:pPr algn="ctr"/>
-          </a:p>
-        </p:txBody>
-      </p:sp>
-      <p:sp>
-        <p:nvSpPr>
-          <p:cNvPr id="25" name="Rectangle 24"/>
-          <p:cNvSpPr/>
-          <p:nvPr/>
-        </p:nvSpPr>
-        <p:spPr>
-          <a:xfrm>
-            <a:off x="5022982" y="1188720"/>
-            <a:ext cx="2145731" cy="548640"/>
-          </a:xfrm>
-          <a:prstGeom prst="rect">
-            <a:avLst/>
-          </a:prstGeom>
-          <a:solidFill>
-            <a:srgbClr val="1D1D4D"/>
-          </a:solidFill>
-          <a:ln>
-            <a:noFill/>
-          </a:ln>
-        </p:spPr>
-        <p:style>
-          <a:lnRef idx="1">
-            <a:schemeClr val="accent1"/>
-          </a:lnRef>
-          <a:fillRef idx="3">
-            <a:schemeClr val="accent1"/>
-          </a:fillRef>
-          <a:effectRef idx="2">
-            <a:schemeClr val="accent1"/>
-          </a:effectRef>
-          <a:fontRef idx="minor">
-            <a:schemeClr val="lt1"/>
-          </a:fontRef>
-        </p:style>
-        <p:txBody>
-          <a:bodyPr rtlCol="0" anchor="ctr"/>
-          <a:lstStyle/>
-          <a:p>
-            <a:pPr algn="ctr"/>
-          </a:p>
-        </p:txBody>
-      </p:sp>
-      <p:sp>
-        <p:nvSpPr>
-          <p:cNvPr id="26" name="TextBox 25"/>
-          <p:cNvSpPr txBox="1"/>
-          <p:nvPr/>
-        </p:nvSpPr>
-        <p:spPr>
-          <a:xfrm>
-            <a:off x="5022982" y="1280160"/>
-            <a:ext cx="2145731" cy="457200"/>
-          </a:xfrm>
-          <a:prstGeom prst="rect">
-            <a:avLst/>
-          </a:prstGeom>
-          <a:noFill/>
-        </p:spPr>
-        <p:txBody>
-          <a:bodyPr wrap="none">
-            <a:spAutoFit/>
-          </a:bodyPr>
-          <a:lstStyle/>
-          <a:p>
-            <a:pPr algn="ctr">
-              <a:defRPr sz="1200" b="1">
-                <a:solidFill>
-                  <a:srgbClr val="FFFFFF"/>
-                </a:solidFill>
-              </a:defRPr>
-            </a:pPr>
-            <a:r>
-              <a:t>SEPT</a:t>
-            </a:r>
-            <a:br/>
-            <a:r>
-              <a:t>5 items</a:t>
-            </a:r>
-          </a:p>
-        </p:txBody>
-      </p:sp>
-      <p:sp>
-        <p:nvSpPr>
-          <p:cNvPr id="27" name="Rectangle 26"/>
-          <p:cNvSpPr/>
-          <p:nvPr/>
-        </p:nvSpPr>
-        <p:spPr>
-          <a:xfrm>
-            <a:off x="5068702" y="1828800"/>
-            <a:ext cx="2054291" cy="384048"/>
-          </a:xfrm>
-          <a:prstGeom prst="rect">
-            <a:avLst/>
-          </a:prstGeom>
-          <a:solidFill>
-            <a:srgbClr val="E6EEF5"/>
-          </a:solidFill>
-          <a:ln>
-            <a:noFill/>
-          </a:ln>
-        </p:spPr>
-        <p:style>
-          <a:lnRef idx="1">
-            <a:schemeClr val="accent1"/>
-          </a:lnRef>
-          <a:fillRef idx="3">
-            <a:schemeClr val="accent1"/>
-          </a:fillRef>
-          <a:effectRef idx="2">
-            <a:schemeClr val="accent1"/>
-          </a:effectRef>
-          <a:fontRef idx="minor">
-            <a:schemeClr val="lt1"/>
-          </a:fontRef>
-        </p:style>
-        <p:txBody>
-          <a:bodyPr rtlCol="0" anchor="ctr"/>
-          <a:lstStyle/>
-          <a:p>
-            <a:pPr algn="ctr"/>
-          </a:p>
-        </p:txBody>
-      </p:sp>
-      <p:sp>
-        <p:nvSpPr>
-          <p:cNvPr id="28" name="TextBox 27"/>
-          <p:cNvSpPr txBox="1"/>
-          <p:nvPr/>
-        </p:nvSpPr>
-        <p:spPr>
-          <a:xfrm>
-            <a:off x="5114422" y="1847088"/>
-            <a:ext cx="1962851" cy="384048"/>
-          </a:xfrm>
-          <a:prstGeom prst="rect">
-            <a:avLst/>
-          </a:prstGeom>
-          <a:noFill/>
-        </p:spPr>
-        <p:txBody>
-          <a:bodyPr wrap="square">
-            <a:spAutoFit/>
-          </a:bodyPr>
-          <a:lstStyle/>
-          <a:p>
-            <a:pPr>
-              <a:defRPr sz="900" b="1">
-                <a:solidFill>
-                  <a:srgbClr val="1D1D4D"/>
-                </a:solidFill>
-              </a:defRPr>
-            </a:pPr>
-            <a:r>
-              <a:t>#15 MGS-13098</a:t>
-            </a:r>
-          </a:p>
-          <a:p>
-            <a:pPr>
-              <a:defRPr sz="800">
-                <a:solidFill>
-                  <a:srgbClr val="5C5C7A"/>
-                </a:solidFill>
-              </a:defRPr>
-            </a:pPr>
-            <a:r>
-              <a:t>Increase levels of robot validation</a:t>
-            </a:r>
-          </a:p>
-        </p:txBody>
-      </p:sp>
-      <p:sp>
-        <p:nvSpPr>
-          <p:cNvPr id="29" name="Rectangle 28"/>
-          <p:cNvSpPr/>
-          <p:nvPr/>
-        </p:nvSpPr>
-        <p:spPr>
-          <a:xfrm>
-            <a:off x="5068702" y="2212848"/>
-            <a:ext cx="2054291" cy="384048"/>
-          </a:xfrm>
-          <a:prstGeom prst="rect">
-            <a:avLst/>
-          </a:prstGeom>
-          <a:solidFill>
-            <a:srgbClr val="FFFFFF"/>
-          </a:solidFill>
-          <a:ln>
-            <a:noFill/>
-          </a:ln>
-        </p:spPr>
-        <p:style>
-          <a:lnRef idx="1">
-            <a:schemeClr val="accent1"/>
-          </a:lnRef>
-          <a:fillRef idx="3">
-            <a:schemeClr val="accent1"/>
-          </a:fillRef>
-          <a:effectRef idx="2">
-            <a:schemeClr val="accent1"/>
-          </a:effectRef>
-          <a:fontRef idx="minor">
-            <a:schemeClr val="lt1"/>
-          </a:fontRef>
-        </p:style>
-        <p:txBody>
-          <a:bodyPr rtlCol="0" anchor="ctr"/>
-          <a:lstStyle/>
-          <a:p>
-            <a:pPr algn="ctr"/>
-          </a:p>
-        </p:txBody>
-      </p:sp>
-      <p:sp>
-        <p:nvSpPr>
-          <p:cNvPr id="30" name="TextBox 29"/>
-          <p:cNvSpPr txBox="1"/>
-          <p:nvPr/>
-        </p:nvSpPr>
-        <p:spPr>
-          <a:xfrm>
-            <a:off x="5114422" y="2231136"/>
-            <a:ext cx="1962851" cy="384048"/>
-          </a:xfrm>
-          <a:prstGeom prst="rect">
-            <a:avLst/>
-          </a:prstGeom>
-          <a:noFill/>
-        </p:spPr>
-        <p:txBody>
-          <a:bodyPr wrap="square">
-            <a:spAutoFit/>
-          </a:bodyPr>
-          <a:lstStyle/>
-          <a:p>
-            <a:pPr>
-              <a:defRPr sz="900" b="1">
-                <a:solidFill>
-                  <a:srgbClr val="1D1D4D"/>
-                </a:solidFill>
-              </a:defRPr>
-            </a:pPr>
-            <a:r>
-              <a:t>#32 MGS-13105</a:t>
-            </a:r>
-          </a:p>
-          <a:p>
-            <a:pPr>
-              <a:defRPr sz="800">
-                <a:solidFill>
-                  <a:srgbClr val="5C5C7A"/>
-                </a:solidFill>
-              </a:defRPr>
-            </a:pPr>
-            <a:r>
-              <a:t>Robot to park data entry exceptions unti...</a:t>
-            </a:r>
-          </a:p>
-        </p:txBody>
-      </p:sp>
-      <p:sp>
-        <p:nvSpPr>
-          <p:cNvPr id="31" name="Rectangle 30"/>
-          <p:cNvSpPr/>
-          <p:nvPr/>
-        </p:nvSpPr>
-        <p:spPr>
-          <a:xfrm>
-            <a:off x="5068702" y="2596896"/>
-            <a:ext cx="2054291" cy="384048"/>
-          </a:xfrm>
-          <a:prstGeom prst="rect">
-            <a:avLst/>
-          </a:prstGeom>
-          <a:solidFill>
-            <a:srgbClr val="E6EEF5"/>
-          </a:solidFill>
-          <a:ln>
-            <a:noFill/>
-          </a:ln>
-        </p:spPr>
-        <p:style>
-          <a:lnRef idx="1">
-            <a:schemeClr val="accent1"/>
-          </a:lnRef>
-          <a:fillRef idx="3">
-            <a:schemeClr val="accent1"/>
-          </a:fillRef>
-          <a:effectRef idx="2">
-            <a:schemeClr val="accent1"/>
-          </a:effectRef>
-          <a:fontRef idx="minor">
-            <a:schemeClr val="lt1"/>
-          </a:fontRef>
-        </p:style>
-        <p:txBody>
-          <a:bodyPr rtlCol="0" anchor="ctr"/>
-          <a:lstStyle/>
-          <a:p>
-            <a:pPr algn="ctr"/>
-          </a:p>
-        </p:txBody>
-      </p:sp>
-      <p:sp>
-        <p:nvSpPr>
-          <p:cNvPr id="32" name="TextBox 31"/>
-          <p:cNvSpPr txBox="1"/>
-          <p:nvPr/>
-        </p:nvSpPr>
-        <p:spPr>
-          <a:xfrm>
-            <a:off x="5114422" y="2615184"/>
-            <a:ext cx="1962851" cy="384048"/>
-          </a:xfrm>
-          <a:prstGeom prst="rect">
-            <a:avLst/>
-          </a:prstGeom>
-          <a:noFill/>
-        </p:spPr>
-        <p:txBody>
-          <a:bodyPr wrap="square">
-            <a:spAutoFit/>
-          </a:bodyPr>
-          <a:lstStyle/>
-          <a:p>
-            <a:pPr>
-              <a:defRPr sz="900" b="1">
-                <a:solidFill>
-                  <a:srgbClr val="1D1D4D"/>
-                </a:solidFill>
-              </a:defRPr>
-            </a:pPr>
-            <a:r>
-              <a:t>#35 MGS-13077</a:t>
-            </a:r>
-          </a:p>
-          <a:p>
-            <a:pPr>
-              <a:defRPr sz="800">
-                <a:solidFill>
-                  <a:srgbClr val="5C5C7A"/>
-                </a:solidFill>
-              </a:defRPr>
-            </a:pPr>
-            <a:r>
-              <a:t>Remove restriction on BDM seeing propert...</a:t>
-            </a:r>
-          </a:p>
-        </p:txBody>
-      </p:sp>
-      <p:sp>
-        <p:nvSpPr>
-          <p:cNvPr id="33" name="Rectangle 32"/>
-          <p:cNvSpPr/>
-          <p:nvPr/>
-        </p:nvSpPr>
-        <p:spPr>
-          <a:xfrm>
-            <a:off x="5068702" y="2980944"/>
-            <a:ext cx="2054291" cy="384048"/>
-          </a:xfrm>
-          <a:prstGeom prst="rect">
-            <a:avLst/>
-          </a:prstGeom>
-          <a:solidFill>
-            <a:srgbClr val="FFFFFF"/>
-          </a:solidFill>
-          <a:ln>
-            <a:noFill/>
-          </a:ln>
-        </p:spPr>
-        <p:style>
-          <a:lnRef idx="1">
-            <a:schemeClr val="accent1"/>
-          </a:lnRef>
-          <a:fillRef idx="3">
-            <a:schemeClr val="accent1"/>
-          </a:fillRef>
-          <a:effectRef idx="2">
-            <a:schemeClr val="accent1"/>
-          </a:effectRef>
-          <a:fontRef idx="minor">
-            <a:schemeClr val="lt1"/>
-          </a:fontRef>
-        </p:style>
-        <p:txBody>
-          <a:bodyPr rtlCol="0" anchor="ctr"/>
-          <a:lstStyle/>
-          <a:p>
-            <a:pPr algn="ctr"/>
-          </a:p>
-        </p:txBody>
-      </p:sp>
-      <p:sp>
-        <p:nvSpPr>
-          <p:cNvPr id="34" name="TextBox 33"/>
-          <p:cNvSpPr txBox="1"/>
-          <p:nvPr/>
-        </p:nvSpPr>
-        <p:spPr>
-          <a:xfrm>
-            <a:off x="5114422" y="2999232"/>
-            <a:ext cx="1962851" cy="384048"/>
-          </a:xfrm>
-          <a:prstGeom prst="rect">
-            <a:avLst/>
-          </a:prstGeom>
-          <a:noFill/>
-        </p:spPr>
-        <p:txBody>
-          <a:bodyPr wrap="square">
-            <a:spAutoFit/>
-          </a:bodyPr>
-          <a:lstStyle/>
-          <a:p>
-            <a:pPr>
-              <a:defRPr sz="900" b="1">
-                <a:solidFill>
-                  <a:srgbClr val="1D1D4D"/>
-                </a:solidFill>
-              </a:defRPr>
-            </a:pPr>
-            <a:r>
-              <a:t>#39 MGS-13070</a:t>
-            </a:r>
-          </a:p>
-          <a:p>
-            <a:pPr>
-              <a:defRPr sz="800">
-                <a:solidFill>
-                  <a:srgbClr val="5C5C7A"/>
-                </a:solidFill>
-              </a:defRPr>
-            </a:pPr>
-            <a:r>
-              <a:t>Make case status visible in Case Tracker</a:t>
-            </a:r>
-          </a:p>
-        </p:txBody>
-      </p:sp>
-      <p:sp>
-        <p:nvSpPr>
-          <p:cNvPr id="35" name="Rectangle 34"/>
-          <p:cNvSpPr/>
-          <p:nvPr/>
-        </p:nvSpPr>
-        <p:spPr>
-          <a:xfrm>
-            <a:off x="5068702" y="3364992"/>
-            <a:ext cx="2054291" cy="384048"/>
-          </a:xfrm>
-          <a:prstGeom prst="rect">
-            <a:avLst/>
-          </a:prstGeom>
-          <a:solidFill>
-            <a:srgbClr val="E6EEF5"/>
-          </a:solidFill>
-          <a:ln>
-            <a:noFill/>
-          </a:ln>
-        </p:spPr>
-        <p:style>
-          <a:lnRef idx="1">
-            <a:schemeClr val="accent1"/>
-          </a:lnRef>
-          <a:fillRef idx="3">
-            <a:schemeClr val="accent1"/>
-          </a:fillRef>
-          <a:effectRef idx="2">
-            <a:schemeClr val="accent1"/>
-          </a:effectRef>
-          <a:fontRef idx="minor">
-            <a:schemeClr val="lt1"/>
-          </a:fontRef>
-        </p:style>
-        <p:txBody>
-          <a:bodyPr rtlCol="0" anchor="ctr"/>
-          <a:lstStyle/>
-          <a:p>
-            <a:pPr algn="ctr"/>
-          </a:p>
-        </p:txBody>
-      </p:sp>
-      <p:sp>
-        <p:nvSpPr>
-          <p:cNvPr id="36" name="TextBox 35"/>
-          <p:cNvSpPr txBox="1"/>
-          <p:nvPr/>
-        </p:nvSpPr>
-        <p:spPr>
-          <a:xfrm>
-            <a:off x="5114422" y="3383280"/>
-            <a:ext cx="1962851" cy="384048"/>
-          </a:xfrm>
-          <a:prstGeom prst="rect">
-            <a:avLst/>
-          </a:prstGeom>
-          <a:noFill/>
-        </p:spPr>
-        <p:txBody>
-          <a:bodyPr wrap="square">
-            <a:spAutoFit/>
-          </a:bodyPr>
-          <a:lstStyle/>
-          <a:p>
-            <a:pPr>
-              <a:defRPr sz="900" b="1">
-                <a:solidFill>
-                  <a:srgbClr val="1D1D4D"/>
-                </a:solidFill>
-              </a:defRPr>
-            </a:pPr>
-            <a:r>
-              <a:t>#40 MGS-12827</a:t>
-            </a:r>
-          </a:p>
-          <a:p>
-            <a:pPr>
-              <a:defRPr sz="800">
-                <a:solidFill>
-                  <a:srgbClr val="5C5C7A"/>
-                </a:solidFill>
-              </a:defRPr>
-            </a:pPr>
-            <a:r>
-              <a:t>Remove Valuation Visibility Restrictions</a:t>
-            </a:r>
-          </a:p>
-        </p:txBody>
-      </p:sp>
-      <p:sp>
-        <p:nvSpPr>
-          <p:cNvPr id="37" name="Rounded Rectangle 36"/>
-          <p:cNvSpPr/>
-          <p:nvPr/>
-        </p:nvSpPr>
-        <p:spPr>
-          <a:xfrm>
-            <a:off x="7305873" y="1188720"/>
-            <a:ext cx="2145731" cy="4572000"/>
-          </a:xfrm>
-          <a:prstGeom prst="roundRect">
-            <a:avLst/>
-          </a:prstGeom>
-          <a:solidFill>
-            <a:srgbClr val="FFFFFF"/>
-          </a:solidFill>
-          <a:ln w="25400">
-            <a:solidFill>
-              <a:srgbClr val="1D1D4D"/>
-            </a:solidFill>
-          </a:ln>
-        </p:spPr>
-        <p:style>
-          <a:lnRef idx="1">
-            <a:schemeClr val="accent1"/>
-          </a:lnRef>
-          <a:fillRef idx="3">
-            <a:schemeClr val="accent1"/>
-          </a:fillRef>
-          <a:effectRef idx="2">
-            <a:schemeClr val="accent1"/>
-          </a:effectRef>
-          <a:fontRef idx="minor">
-            <a:schemeClr val="lt1"/>
-          </a:fontRef>
-        </p:style>
-        <p:txBody>
-          <a:bodyPr rtlCol="0" anchor="ctr"/>
-          <a:lstStyle/>
-          <a:p>
-            <a:pPr algn="ctr"/>
-          </a:p>
-        </p:txBody>
-      </p:sp>
-      <p:sp>
-        <p:nvSpPr>
-          <p:cNvPr id="38" name="Rectangle 37"/>
-          <p:cNvSpPr/>
-          <p:nvPr/>
-        </p:nvSpPr>
-        <p:spPr>
-          <a:xfrm>
-            <a:off x="7305873" y="1188720"/>
-            <a:ext cx="2145731" cy="548640"/>
-          </a:xfrm>
-          <a:prstGeom prst="rect">
-            <a:avLst/>
-          </a:prstGeom>
-          <a:solidFill>
-            <a:srgbClr val="1D1D4D"/>
-          </a:solidFill>
-          <a:ln>
-            <a:noFill/>
-          </a:ln>
-        </p:spPr>
-        <p:style>
-          <a:lnRef idx="1">
-            <a:schemeClr val="accent1"/>
-          </a:lnRef>
-          <a:fillRef idx="3">
-            <a:schemeClr val="accent1"/>
-          </a:fillRef>
-          <a:effectRef idx="2">
-            <a:schemeClr val="accent1"/>
-          </a:effectRef>
-          <a:fontRef idx="minor">
-            <a:schemeClr val="lt1"/>
-          </a:fontRef>
-        </p:style>
-        <p:txBody>
-          <a:bodyPr rtlCol="0" anchor="ctr"/>
-          <a:lstStyle/>
-          <a:p>
-            <a:pPr algn="ctr"/>
-          </a:p>
-        </p:txBody>
-      </p:sp>
-      <p:sp>
-        <p:nvSpPr>
-          <p:cNvPr id="39" name="TextBox 38"/>
-          <p:cNvSpPr txBox="1"/>
-          <p:nvPr/>
-        </p:nvSpPr>
-        <p:spPr>
-          <a:xfrm>
-            <a:off x="7305873" y="1280160"/>
-            <a:ext cx="2145731" cy="457200"/>
-          </a:xfrm>
-          <a:prstGeom prst="rect">
-            <a:avLst/>
-          </a:prstGeom>
-          <a:noFill/>
-        </p:spPr>
-        <p:txBody>
-          <a:bodyPr wrap="none">
-            <a:spAutoFit/>
-          </a:bodyPr>
-          <a:lstStyle/>
-          <a:p>
-            <a:pPr algn="ctr">
-              <a:defRPr sz="1200" b="1">
-                <a:solidFill>
-                  <a:srgbClr val="FFFFFF"/>
-                </a:solidFill>
-              </a:defRPr>
-            </a:pPr>
-            <a:r>
-              <a:t>NOV</a:t>
-            </a:r>
-            <a:br/>
-            <a:r>
-              <a:t>2 items</a:t>
-            </a:r>
-          </a:p>
-        </p:txBody>
-      </p:sp>
-      <p:sp>
-        <p:nvSpPr>
-          <p:cNvPr id="40" name="Rectangle 39"/>
-          <p:cNvSpPr/>
-          <p:nvPr/>
-        </p:nvSpPr>
-        <p:spPr>
-          <a:xfrm>
-            <a:off x="7351593" y="1828800"/>
-            <a:ext cx="2054291" cy="384048"/>
-          </a:xfrm>
-          <a:prstGeom prst="rect">
-            <a:avLst/>
-          </a:prstGeom>
-          <a:solidFill>
-            <a:srgbClr val="E6EEF5"/>
-          </a:solidFill>
-          <a:ln>
-            <a:noFill/>
-          </a:ln>
-        </p:spPr>
-        <p:style>
-          <a:lnRef idx="1">
-            <a:schemeClr val="accent1"/>
-          </a:lnRef>
-          <a:fillRef idx="3">
-            <a:schemeClr val="accent1"/>
-          </a:fillRef>
-          <a:effectRef idx="2">
-            <a:schemeClr val="accent1"/>
-          </a:effectRef>
-          <a:fontRef idx="minor">
-            <a:schemeClr val="lt1"/>
-          </a:fontRef>
-        </p:style>
-        <p:txBody>
-          <a:bodyPr rtlCol="0" anchor="ctr"/>
-          <a:lstStyle/>
-          <a:p>
-            <a:pPr algn="ctr"/>
-          </a:p>
-        </p:txBody>
-      </p:sp>
-      <p:sp>
-        <p:nvSpPr>
-          <p:cNvPr id="41" name="TextBox 40"/>
-          <p:cNvSpPr txBox="1"/>
-          <p:nvPr/>
-        </p:nvSpPr>
-        <p:spPr>
-          <a:xfrm>
-            <a:off x="7397313" y="1847088"/>
-            <a:ext cx="1962851" cy="384048"/>
-          </a:xfrm>
-          <a:prstGeom prst="rect">
-            <a:avLst/>
-          </a:prstGeom>
-          <a:noFill/>
-        </p:spPr>
-        <p:txBody>
-          <a:bodyPr wrap="square">
-            <a:spAutoFit/>
-          </a:bodyPr>
-          <a:lstStyle/>
-          <a:p>
-            <a:pPr>
-              <a:defRPr sz="900" b="1">
-                <a:solidFill>
-                  <a:srgbClr val="1D1D4D"/>
-                </a:solidFill>
-              </a:defRPr>
-            </a:pPr>
-            <a:r>
-              <a:t>#28 MGS-12832</a:t>
-            </a:r>
-          </a:p>
-          <a:p>
-            <a:pPr>
-              <a:defRPr sz="800">
-                <a:solidFill>
-                  <a:srgbClr val="5C5C7A"/>
-                </a:solidFill>
-              </a:defRPr>
-            </a:pPr>
-            <a:r>
-              <a:t>Existing Customer Online Application</a:t>
-            </a:r>
-          </a:p>
-        </p:txBody>
-      </p:sp>
-      <p:sp>
-        <p:nvSpPr>
-          <p:cNvPr id="42" name="Rectangle 41"/>
-          <p:cNvSpPr/>
-          <p:nvPr/>
-        </p:nvSpPr>
-        <p:spPr>
-          <a:xfrm>
-            <a:off x="7351593" y="2212848"/>
-            <a:ext cx="2054291" cy="384048"/>
-          </a:xfrm>
-          <a:prstGeom prst="rect">
-            <a:avLst/>
-          </a:prstGeom>
-          <a:solidFill>
-            <a:srgbClr val="FFFFFF"/>
-          </a:solidFill>
-          <a:ln>
-            <a:noFill/>
-          </a:ln>
-        </p:spPr>
-        <p:style>
-          <a:lnRef idx="1">
-            <a:schemeClr val="accent1"/>
-          </a:lnRef>
-          <a:fillRef idx="3">
-            <a:schemeClr val="accent1"/>
-          </a:fillRef>
-          <a:effectRef idx="2">
-            <a:schemeClr val="accent1"/>
-          </a:effectRef>
-          <a:fontRef idx="minor">
-            <a:schemeClr val="lt1"/>
-          </a:fontRef>
-        </p:style>
-        <p:txBody>
-          <a:bodyPr rtlCol="0" anchor="ctr"/>
-          <a:lstStyle/>
-          <a:p>
-            <a:pPr algn="ctr"/>
-          </a:p>
-        </p:txBody>
-      </p:sp>
-      <p:sp>
-        <p:nvSpPr>
-          <p:cNvPr id="43" name="TextBox 42"/>
-          <p:cNvSpPr txBox="1"/>
-          <p:nvPr/>
-        </p:nvSpPr>
-        <p:spPr>
-          <a:xfrm>
-            <a:off x="7397313" y="2231136"/>
-            <a:ext cx="1962851" cy="384048"/>
-          </a:xfrm>
-          <a:prstGeom prst="rect">
-            <a:avLst/>
-          </a:prstGeom>
-          <a:noFill/>
-        </p:spPr>
-        <p:txBody>
-          <a:bodyPr wrap="square">
-            <a:spAutoFit/>
-          </a:bodyPr>
-          <a:lstStyle/>
-          <a:p>
-            <a:pPr>
-              <a:defRPr sz="900" b="1">
-                <a:solidFill>
-                  <a:srgbClr val="1D1D4D"/>
-                </a:solidFill>
-              </a:defRPr>
-            </a:pPr>
-            <a:r>
-              <a:t>#31 MGS-12831</a:t>
-            </a:r>
-          </a:p>
-          <a:p>
-            <a:pPr>
-              <a:defRPr sz="800">
-                <a:solidFill>
-                  <a:srgbClr val="5C5C7A"/>
-                </a:solidFill>
-              </a:defRPr>
-            </a:pPr>
-            <a:r>
-              <a:t>Worldpay to Global Pay</a:t>
-            </a:r>
-          </a:p>
-        </p:txBody>
-      </p:sp>
-      <p:sp>
-        <p:nvSpPr>
-          <p:cNvPr id="44" name="Rounded Rectangle 43"/>
-          <p:cNvSpPr/>
-          <p:nvPr/>
-        </p:nvSpPr>
-        <p:spPr>
-          <a:xfrm>
-            <a:off x="9588764" y="1188720"/>
-            <a:ext cx="2145731" cy="4572000"/>
-          </a:xfrm>
-          <a:prstGeom prst="roundRect">
-            <a:avLst/>
-          </a:prstGeom>
-          <a:solidFill>
-            <a:srgbClr val="FFFFFF"/>
-          </a:solidFill>
-          <a:ln w="25400">
-            <a:solidFill>
-              <a:srgbClr val="1D1D4D"/>
-            </a:solidFill>
-          </a:ln>
-        </p:spPr>
-        <p:style>
-          <a:lnRef idx="1">
-            <a:schemeClr val="accent1"/>
-          </a:lnRef>
-          <a:fillRef idx="3">
-            <a:schemeClr val="accent1"/>
-          </a:fillRef>
-          <a:effectRef idx="2">
-            <a:schemeClr val="accent1"/>
-          </a:effectRef>
-          <a:fontRef idx="minor">
-            <a:schemeClr val="lt1"/>
-          </a:fontRef>
-        </p:style>
-        <p:txBody>
-          <a:bodyPr rtlCol="0" anchor="ctr"/>
-          <a:lstStyle/>
-          <a:p>
-            <a:pPr algn="ctr"/>
-          </a:p>
-        </p:txBody>
-      </p:sp>
-      <p:sp>
-        <p:nvSpPr>
-          <p:cNvPr id="45" name="Rectangle 44"/>
-          <p:cNvSpPr/>
-          <p:nvPr/>
-        </p:nvSpPr>
-        <p:spPr>
-          <a:xfrm>
-            <a:off x="9588764" y="1188720"/>
-            <a:ext cx="2145731" cy="548640"/>
-          </a:xfrm>
-          <a:prstGeom prst="rect">
-            <a:avLst/>
-          </a:prstGeom>
-          <a:solidFill>
-            <a:srgbClr val="1D1D4D"/>
-          </a:solidFill>
-          <a:ln>
-            <a:noFill/>
-          </a:ln>
-        </p:spPr>
-        <p:style>
-          <a:lnRef idx="1">
-            <a:schemeClr val="accent1"/>
-          </a:lnRef>
-          <a:fillRef idx="3">
-            <a:schemeClr val="accent1"/>
-          </a:fillRef>
-          <a:effectRef idx="2">
-            <a:schemeClr val="accent1"/>
-          </a:effectRef>
-          <a:fontRef idx="minor">
-            <a:schemeClr val="lt1"/>
-          </a:fontRef>
-        </p:style>
-        <p:txBody>
-          <a:bodyPr rtlCol="0" anchor="ctr"/>
-          <a:lstStyle/>
-          <a:p>
-            <a:pPr algn="ctr"/>
-          </a:p>
-        </p:txBody>
-      </p:sp>
-      <p:sp>
-        <p:nvSpPr>
-          <p:cNvPr id="46" name="TextBox 45"/>
-          <p:cNvSpPr txBox="1"/>
-          <p:nvPr/>
-        </p:nvSpPr>
-        <p:spPr>
-          <a:xfrm>
-            <a:off x="9588764" y="1280160"/>
-            <a:ext cx="2145731" cy="457200"/>
-          </a:xfrm>
-          <a:prstGeom prst="rect">
-            <a:avLst/>
-          </a:prstGeom>
-          <a:noFill/>
-        </p:spPr>
-        <p:txBody>
-          <a:bodyPr wrap="none">
-            <a:spAutoFit/>
-          </a:bodyPr>
-          <a:lstStyle/>
-          <a:p>
-            <a:pPr algn="ctr">
-              <a:defRPr sz="1200" b="1">
-                <a:solidFill>
-                  <a:srgbClr val="FFFFFF"/>
-                </a:solidFill>
-              </a:defRPr>
-            </a:pPr>
-            <a:r>
-              <a:t>MAR 2027</a:t>
-            </a:r>
-            <a:br/>
-            <a:r>
-              <a:t>19 items</a:t>
-            </a:r>
-          </a:p>
-        </p:txBody>
-      </p:sp>
-      <p:sp>
-        <p:nvSpPr>
-          <p:cNvPr id="47" name="Rectangle 46"/>
-          <p:cNvSpPr/>
-          <p:nvPr/>
-        </p:nvSpPr>
-        <p:spPr>
-          <a:xfrm>
-            <a:off x="9634484" y="1828800"/>
-            <a:ext cx="2054291" cy="384048"/>
-          </a:xfrm>
-          <a:prstGeom prst="rect">
-            <a:avLst/>
-          </a:prstGeom>
-          <a:solidFill>
-            <a:srgbClr val="E6EEF5"/>
-          </a:solidFill>
-          <a:ln>
-            <a:noFill/>
-          </a:ln>
-        </p:spPr>
-        <p:style>
-          <a:lnRef idx="1">
-            <a:schemeClr val="accent1"/>
-          </a:lnRef>
-          <a:fillRef idx="3">
-            <a:schemeClr val="accent1"/>
-          </a:fillRef>
-          <a:effectRef idx="2">
-            <a:schemeClr val="accent1"/>
-          </a:effectRef>
-          <a:fontRef idx="minor">
-            <a:schemeClr val="lt1"/>
-          </a:fontRef>
-        </p:style>
-        <p:txBody>
-          <a:bodyPr rtlCol="0" anchor="ctr"/>
-          <a:lstStyle/>
-          <a:p>
-            <a:pPr algn="ctr"/>
-          </a:p>
-        </p:txBody>
-      </p:sp>
-      <p:sp>
-        <p:nvSpPr>
-          <p:cNvPr id="48" name="TextBox 47"/>
-          <p:cNvSpPr txBox="1"/>
-          <p:nvPr/>
-        </p:nvSpPr>
-        <p:spPr>
-          <a:xfrm>
-            <a:off x="9680204" y="1847088"/>
-            <a:ext cx="1962851" cy="384048"/>
-          </a:xfrm>
-          <a:prstGeom prst="rect">
-            <a:avLst/>
-          </a:prstGeom>
-          <a:noFill/>
-        </p:spPr>
-        <p:txBody>
-          <a:bodyPr wrap="square">
-            <a:spAutoFit/>
-          </a:bodyPr>
-          <a:lstStyle/>
-          <a:p>
-            <a:pPr>
-              <a:defRPr sz="900" b="1">
-                <a:solidFill>
-                  <a:srgbClr val="1D1D4D"/>
-                </a:solidFill>
-              </a:defRPr>
-            </a:pPr>
-            <a:r>
-              <a:t>#4 MGS-13067</a:t>
-            </a:r>
-          </a:p>
-          <a:p>
-            <a:pPr>
-              <a:defRPr sz="800">
-                <a:solidFill>
-                  <a:srgbClr val="5C5C7A"/>
-                </a:solidFill>
-              </a:defRPr>
-            </a:pPr>
-            <a:r>
-              <a:t>Create new fields to identify Second/Hol...</a:t>
-            </a:r>
-          </a:p>
-        </p:txBody>
-      </p:sp>
-      <p:sp>
-        <p:nvSpPr>
-          <p:cNvPr id="49" name="Rectangle 48"/>
-          <p:cNvSpPr/>
-          <p:nvPr/>
-        </p:nvSpPr>
-        <p:spPr>
-          <a:xfrm>
-            <a:off x="9634484" y="2212848"/>
-            <a:ext cx="2054291" cy="384048"/>
-          </a:xfrm>
-          <a:prstGeom prst="rect">
-            <a:avLst/>
-          </a:prstGeom>
-          <a:solidFill>
-            <a:srgbClr val="FFFFFF"/>
-          </a:solidFill>
-          <a:ln>
-            <a:noFill/>
-          </a:ln>
-        </p:spPr>
-        <p:style>
-          <a:lnRef idx="1">
-            <a:schemeClr val="accent1"/>
-          </a:lnRef>
-          <a:fillRef idx="3">
-            <a:schemeClr val="accent1"/>
-          </a:fillRef>
-          <a:effectRef idx="2">
-            <a:schemeClr val="accent1"/>
-          </a:effectRef>
-          <a:fontRef idx="minor">
-            <a:schemeClr val="lt1"/>
-          </a:fontRef>
-        </p:style>
-        <p:txBody>
-          <a:bodyPr rtlCol="0" anchor="ctr"/>
-          <a:lstStyle/>
-          <a:p>
-            <a:pPr algn="ctr"/>
-          </a:p>
-        </p:txBody>
-      </p:sp>
-      <p:sp>
-        <p:nvSpPr>
-          <p:cNvPr id="50" name="TextBox 49"/>
-          <p:cNvSpPr txBox="1"/>
-          <p:nvPr/>
-        </p:nvSpPr>
-        <p:spPr>
-          <a:xfrm>
-            <a:off x="9680204" y="2231136"/>
-            <a:ext cx="1962851" cy="384048"/>
-          </a:xfrm>
-          <a:prstGeom prst="rect">
-            <a:avLst/>
-          </a:prstGeom>
-          <a:noFill/>
-        </p:spPr>
-        <p:txBody>
-          <a:bodyPr wrap="square">
-            <a:spAutoFit/>
-          </a:bodyPr>
-          <a:lstStyle/>
-          <a:p>
-            <a:pPr>
-              <a:defRPr sz="900" b="1">
-                <a:solidFill>
-                  <a:srgbClr val="1D1D4D"/>
-                </a:solidFill>
-              </a:defRPr>
-            </a:pPr>
-            <a:r>
-              <a:t>#5 MGS-13066</a:t>
-            </a:r>
-          </a:p>
-          <a:p>
-            <a:pPr>
-              <a:defRPr sz="800">
-                <a:solidFill>
-                  <a:srgbClr val="5C5C7A"/>
-                </a:solidFill>
-              </a:defRPr>
-            </a:pPr>
-            <a:r>
-              <a:t>Create Variable Income fields and pass d...</a:t>
-            </a:r>
-          </a:p>
-        </p:txBody>
-      </p:sp>
-      <p:sp>
-        <p:nvSpPr>
-          <p:cNvPr id="51" name="Rectangle 50"/>
-          <p:cNvSpPr/>
-          <p:nvPr/>
-        </p:nvSpPr>
-        <p:spPr>
-          <a:xfrm>
-            <a:off x="9634484" y="2596896"/>
-            <a:ext cx="2054291" cy="384048"/>
-          </a:xfrm>
-          <a:prstGeom prst="rect">
-            <a:avLst/>
-          </a:prstGeom>
-          <a:solidFill>
-            <a:srgbClr val="E6EEF5"/>
-          </a:solidFill>
-          <a:ln>
-            <a:noFill/>
-          </a:ln>
-        </p:spPr>
-        <p:style>
-          <a:lnRef idx="1">
-            <a:schemeClr val="accent1"/>
-          </a:lnRef>
-          <a:fillRef idx="3">
-            <a:schemeClr val="accent1"/>
-          </a:fillRef>
-          <a:effectRef idx="2">
-            <a:schemeClr val="accent1"/>
-          </a:effectRef>
-          <a:fontRef idx="minor">
-            <a:schemeClr val="lt1"/>
-          </a:fontRef>
-        </p:style>
-        <p:txBody>
-          <a:bodyPr rtlCol="0" anchor="ctr"/>
-          <a:lstStyle/>
-          <a:p>
-            <a:pPr algn="ctr"/>
-          </a:p>
-        </p:txBody>
-      </p:sp>
-      <p:sp>
-        <p:nvSpPr>
-          <p:cNvPr id="52" name="TextBox 51"/>
-          <p:cNvSpPr txBox="1"/>
-          <p:nvPr/>
-        </p:nvSpPr>
-        <p:spPr>
-          <a:xfrm>
-            <a:off x="9680204" y="2615184"/>
-            <a:ext cx="1962851" cy="384048"/>
-          </a:xfrm>
-          <a:prstGeom prst="rect">
-            <a:avLst/>
-          </a:prstGeom>
-          <a:noFill/>
-        </p:spPr>
-        <p:txBody>
-          <a:bodyPr wrap="square">
-            <a:spAutoFit/>
-          </a:bodyPr>
-          <a:lstStyle/>
-          <a:p>
-            <a:pPr>
-              <a:defRPr sz="900" b="1">
-                <a:solidFill>
-                  <a:srgbClr val="1D1D4D"/>
-                </a:solidFill>
-              </a:defRPr>
-            </a:pPr>
-            <a:r>
-              <a:t>#6 MGS-13062</a:t>
-            </a:r>
-          </a:p>
-          <a:p>
-            <a:pPr>
-              <a:defRPr sz="800">
-                <a:solidFill>
-                  <a:srgbClr val="5C5C7A"/>
-                </a:solidFill>
-              </a:defRPr>
-            </a:pPr>
-            <a:r>
-              <a:t>Create new fields for Joint Borrower Sol...</a:t>
-            </a:r>
-          </a:p>
-        </p:txBody>
-      </p:sp>
-      <p:sp>
-        <p:nvSpPr>
-          <p:cNvPr id="53" name="Rectangle 52"/>
-          <p:cNvSpPr/>
-          <p:nvPr/>
-        </p:nvSpPr>
-        <p:spPr>
-          <a:xfrm>
-            <a:off x="9634484" y="2980944"/>
-            <a:ext cx="2054291" cy="384048"/>
-          </a:xfrm>
-          <a:prstGeom prst="rect">
-            <a:avLst/>
-          </a:prstGeom>
-          <a:solidFill>
-            <a:srgbClr val="FFFFFF"/>
-          </a:solidFill>
-          <a:ln>
-            <a:noFill/>
-          </a:ln>
-        </p:spPr>
-        <p:style>
-          <a:lnRef idx="1">
-            <a:schemeClr val="accent1"/>
-          </a:lnRef>
-          <a:fillRef idx="3">
-            <a:schemeClr val="accent1"/>
-          </a:fillRef>
-          <a:effectRef idx="2">
-            <a:schemeClr val="accent1"/>
-          </a:effectRef>
-          <a:fontRef idx="minor">
-            <a:schemeClr val="lt1"/>
-          </a:fontRef>
-        </p:style>
-        <p:txBody>
-          <a:bodyPr rtlCol="0" anchor="ctr"/>
-          <a:lstStyle/>
-          <a:p>
-            <a:pPr algn="ctr"/>
-          </a:p>
-        </p:txBody>
-      </p:sp>
-      <p:sp>
-        <p:nvSpPr>
-          <p:cNvPr id="54" name="TextBox 53"/>
-          <p:cNvSpPr txBox="1"/>
-          <p:nvPr/>
-        </p:nvSpPr>
-        <p:spPr>
-          <a:xfrm>
-            <a:off x="9680204" y="2999232"/>
-            <a:ext cx="1962851" cy="384048"/>
-          </a:xfrm>
-          <a:prstGeom prst="rect">
-            <a:avLst/>
-          </a:prstGeom>
-          <a:noFill/>
-        </p:spPr>
-        <p:txBody>
-          <a:bodyPr wrap="square">
-            <a:spAutoFit/>
-          </a:bodyPr>
-          <a:lstStyle/>
-          <a:p>
-            <a:pPr>
-              <a:defRPr sz="900" b="1">
-                <a:solidFill>
-                  <a:srgbClr val="1D1D4D"/>
-                </a:solidFill>
-              </a:defRPr>
-            </a:pPr>
-            <a:r>
-              <a:t>#8 MGS-13063</a:t>
-            </a:r>
-          </a:p>
-          <a:p>
-            <a:pPr>
-              <a:defRPr sz="800">
-                <a:solidFill>
-                  <a:srgbClr val="5C5C7A"/>
-                </a:solidFill>
-              </a:defRPr>
-            </a:pPr>
-            <a:r>
-              <a:t>Create additional fields for Self Employ...</a:t>
-            </a:r>
-          </a:p>
-        </p:txBody>
-      </p:sp>
-      <p:sp>
-        <p:nvSpPr>
-          <p:cNvPr id="55" name="Rectangle 54"/>
-          <p:cNvSpPr/>
-          <p:nvPr/>
-        </p:nvSpPr>
-        <p:spPr>
-          <a:xfrm>
-            <a:off x="9634484" y="3364992"/>
-            <a:ext cx="2054291" cy="384048"/>
-          </a:xfrm>
-          <a:prstGeom prst="rect">
-            <a:avLst/>
-          </a:prstGeom>
-          <a:solidFill>
-            <a:srgbClr val="E6EEF5"/>
-          </a:solidFill>
-          <a:ln>
-            <a:noFill/>
-          </a:ln>
-        </p:spPr>
-        <p:style>
-          <a:lnRef idx="1">
-            <a:schemeClr val="accent1"/>
-          </a:lnRef>
-          <a:fillRef idx="3">
-            <a:schemeClr val="accent1"/>
-          </a:fillRef>
-          <a:effectRef idx="2">
-            <a:schemeClr val="accent1"/>
-          </a:effectRef>
-          <a:fontRef idx="minor">
-            <a:schemeClr val="lt1"/>
-          </a:fontRef>
-        </p:style>
-        <p:txBody>
-          <a:bodyPr rtlCol="0" anchor="ctr"/>
-          <a:lstStyle/>
-          <a:p>
-            <a:pPr algn="ctr"/>
-          </a:p>
-        </p:txBody>
-      </p:sp>
-      <p:sp>
-        <p:nvSpPr>
-          <p:cNvPr id="56" name="TextBox 55"/>
-          <p:cNvSpPr txBox="1"/>
-          <p:nvPr/>
-        </p:nvSpPr>
-        <p:spPr>
-          <a:xfrm>
-            <a:off x="9680204" y="3383280"/>
-            <a:ext cx="1962851" cy="384048"/>
-          </a:xfrm>
-          <a:prstGeom prst="rect">
-            <a:avLst/>
-          </a:prstGeom>
-          <a:noFill/>
-        </p:spPr>
-        <p:txBody>
-          <a:bodyPr wrap="square">
-            <a:spAutoFit/>
-          </a:bodyPr>
-          <a:lstStyle/>
-          <a:p>
-            <a:pPr>
-              <a:defRPr sz="900" b="1">
-                <a:solidFill>
-                  <a:srgbClr val="1D1D4D"/>
-                </a:solidFill>
-              </a:defRPr>
-            </a:pPr>
-            <a:r>
-              <a:t>#9 MGS-12823</a:t>
-            </a:r>
-          </a:p>
-          <a:p>
-            <a:pPr>
-              <a:defRPr sz="800">
-                <a:solidFill>
-                  <a:srgbClr val="5C5C7A"/>
-                </a:solidFill>
-              </a:defRPr>
-            </a:pPr>
-            <a:r>
-              <a:t>Create Secondary Income fields and pass ...</a:t>
-            </a:r>
-          </a:p>
-        </p:txBody>
-      </p:sp>
-      <p:sp>
-        <p:nvSpPr>
-          <p:cNvPr id="57" name="Rectangle 56"/>
-          <p:cNvSpPr/>
-          <p:nvPr/>
-        </p:nvSpPr>
-        <p:spPr>
-          <a:xfrm>
-            <a:off x="9634484" y="3749040"/>
-            <a:ext cx="2054291" cy="384048"/>
-          </a:xfrm>
-          <a:prstGeom prst="rect">
-            <a:avLst/>
-          </a:prstGeom>
-          <a:solidFill>
-            <a:srgbClr val="FFFFFF"/>
-          </a:solidFill>
-          <a:ln>
-            <a:noFill/>
-          </a:ln>
-        </p:spPr>
-        <p:style>
-          <a:lnRef idx="1">
-            <a:schemeClr val="accent1"/>
-          </a:lnRef>
-          <a:fillRef idx="3">
-            <a:schemeClr val="accent1"/>
-          </a:fillRef>
-          <a:effectRef idx="2">
-            <a:schemeClr val="accent1"/>
-          </a:effectRef>
-          <a:fontRef idx="minor">
-            <a:schemeClr val="lt1"/>
-          </a:fontRef>
-        </p:style>
-        <p:txBody>
-          <a:bodyPr rtlCol="0" anchor="ctr"/>
-          <a:lstStyle/>
-          <a:p>
-            <a:pPr algn="ctr"/>
-          </a:p>
-        </p:txBody>
-      </p:sp>
-      <p:sp>
-        <p:nvSpPr>
-          <p:cNvPr id="58" name="TextBox 57"/>
-          <p:cNvSpPr txBox="1"/>
-          <p:nvPr/>
-        </p:nvSpPr>
-        <p:spPr>
-          <a:xfrm>
-            <a:off x="9680204" y="3767328"/>
-            <a:ext cx="1962851" cy="384048"/>
-          </a:xfrm>
-          <a:prstGeom prst="rect">
-            <a:avLst/>
-          </a:prstGeom>
-          <a:noFill/>
-        </p:spPr>
-        <p:txBody>
-          <a:bodyPr wrap="square">
-            <a:spAutoFit/>
-          </a:bodyPr>
-          <a:lstStyle/>
-          <a:p>
-            <a:pPr>
-              <a:defRPr sz="900" b="1">
-                <a:solidFill>
-                  <a:srgbClr val="1D1D4D"/>
-                </a:solidFill>
-              </a:defRPr>
-            </a:pPr>
-            <a:r>
-              <a:t>#18 MGS-13096</a:t>
-            </a:r>
-          </a:p>
-          <a:p>
-            <a:pPr>
-              <a:defRPr sz="800">
-                <a:solidFill>
-                  <a:srgbClr val="5C5C7A"/>
-                </a:solidFill>
-              </a:defRPr>
-            </a:pPr>
-            <a:r>
-              <a:t>Improve clarity of messages in post-docu...</a:t>
-            </a:r>
-          </a:p>
-        </p:txBody>
-      </p:sp>
-      <p:sp>
-        <p:nvSpPr>
-          <p:cNvPr id="59" name="Rectangle 58"/>
-          <p:cNvSpPr/>
-          <p:nvPr/>
-        </p:nvSpPr>
-        <p:spPr>
-          <a:xfrm>
-            <a:off x="9634484" y="4133088"/>
-            <a:ext cx="2054291" cy="384048"/>
-          </a:xfrm>
-          <a:prstGeom prst="rect">
-            <a:avLst/>
-          </a:prstGeom>
-          <a:solidFill>
-            <a:srgbClr val="E6EEF5"/>
-          </a:solidFill>
-          <a:ln>
-            <a:noFill/>
-          </a:ln>
-        </p:spPr>
-        <p:style>
-          <a:lnRef idx="1">
-            <a:schemeClr val="accent1"/>
-          </a:lnRef>
-          <a:fillRef idx="3">
-            <a:schemeClr val="accent1"/>
-          </a:fillRef>
-          <a:effectRef idx="2">
-            <a:schemeClr val="accent1"/>
-          </a:effectRef>
-          <a:fontRef idx="minor">
-            <a:schemeClr val="lt1"/>
-          </a:fontRef>
-        </p:style>
-        <p:txBody>
-          <a:bodyPr rtlCol="0" anchor="ctr"/>
-          <a:lstStyle/>
-          <a:p>
-            <a:pPr algn="ctr"/>
-          </a:p>
-        </p:txBody>
-      </p:sp>
-      <p:sp>
-        <p:nvSpPr>
-          <p:cNvPr id="60" name="TextBox 59"/>
-          <p:cNvSpPr txBox="1"/>
-          <p:nvPr/>
-        </p:nvSpPr>
-        <p:spPr>
-          <a:xfrm>
-            <a:off x="9680204" y="4151376"/>
-            <a:ext cx="1962851" cy="384048"/>
-          </a:xfrm>
-          <a:prstGeom prst="rect">
-            <a:avLst/>
-          </a:prstGeom>
-          <a:noFill/>
-        </p:spPr>
-        <p:txBody>
-          <a:bodyPr wrap="square">
-            <a:spAutoFit/>
-          </a:bodyPr>
-          <a:lstStyle/>
-          <a:p>
-            <a:pPr>
-              <a:defRPr sz="900" b="1">
-                <a:solidFill>
-                  <a:srgbClr val="1D1D4D"/>
-                </a:solidFill>
-              </a:defRPr>
-            </a:pPr>
-            <a:r>
-              <a:t>#19 MGS-12841</a:t>
-            </a:r>
-          </a:p>
-          <a:p>
-            <a:pPr>
-              <a:defRPr sz="800">
-                <a:solidFill>
-                  <a:srgbClr val="5C5C7A"/>
-                </a:solidFill>
-              </a:defRPr>
-            </a:pPr>
-            <a:r>
-              <a:t>Replacement Mortgage Illustrator tool</a:t>
-            </a:r>
-          </a:p>
-        </p:txBody>
-      </p:sp>
-      <p:sp>
-        <p:nvSpPr>
-          <p:cNvPr id="61" name="Rectangle 60"/>
-          <p:cNvSpPr/>
-          <p:nvPr/>
-        </p:nvSpPr>
-        <p:spPr>
-          <a:xfrm>
-            <a:off x="9634484" y="4517136"/>
-            <a:ext cx="2054291" cy="384048"/>
-          </a:xfrm>
-          <a:prstGeom prst="rect">
-            <a:avLst/>
-          </a:prstGeom>
-          <a:solidFill>
-            <a:srgbClr val="FFFFFF"/>
-          </a:solidFill>
-          <a:ln>
-            <a:noFill/>
-          </a:ln>
-        </p:spPr>
-        <p:style>
-          <a:lnRef idx="1">
-            <a:schemeClr val="accent1"/>
-          </a:lnRef>
-          <a:fillRef idx="3">
-            <a:schemeClr val="accent1"/>
-          </a:fillRef>
-          <a:effectRef idx="2">
-            <a:schemeClr val="accent1"/>
-          </a:effectRef>
-          <a:fontRef idx="minor">
-            <a:schemeClr val="lt1"/>
-          </a:fontRef>
-        </p:style>
-        <p:txBody>
-          <a:bodyPr rtlCol="0" anchor="ctr"/>
-          <a:lstStyle/>
-          <a:p>
-            <a:pPr algn="ctr"/>
-          </a:p>
-        </p:txBody>
-      </p:sp>
-      <p:sp>
-        <p:nvSpPr>
-          <p:cNvPr id="62" name="TextBox 61"/>
-          <p:cNvSpPr txBox="1"/>
-          <p:nvPr/>
-        </p:nvSpPr>
-        <p:spPr>
-          <a:xfrm>
-            <a:off x="9680204" y="4535424"/>
-            <a:ext cx="1962851" cy="384048"/>
-          </a:xfrm>
-          <a:prstGeom prst="rect">
-            <a:avLst/>
-          </a:prstGeom>
-          <a:noFill/>
-        </p:spPr>
-        <p:txBody>
-          <a:bodyPr wrap="square">
-            <a:spAutoFit/>
-          </a:bodyPr>
-          <a:lstStyle/>
-          <a:p>
-            <a:pPr>
-              <a:defRPr sz="900" b="1">
-                <a:solidFill>
-                  <a:srgbClr val="1D1D4D"/>
-                </a:solidFill>
-              </a:defRPr>
-            </a:pPr>
-            <a:r>
-              <a:t>#20 MGS-13092</a:t>
-            </a:r>
-          </a:p>
-          <a:p>
-            <a:pPr>
-              <a:defRPr sz="800">
-                <a:solidFill>
-                  <a:srgbClr val="5C5C7A"/>
-                </a:solidFill>
-              </a:defRPr>
-            </a:pPr>
-            <a:r>
-              <a:t>Add date of valuation to MAP chaser lett...</a:t>
-            </a:r>
-          </a:p>
-        </p:txBody>
-      </p:sp>
-      <p:sp>
-        <p:nvSpPr>
-          <p:cNvPr id="63" name="Rectangle 62"/>
-          <p:cNvSpPr/>
-          <p:nvPr/>
-        </p:nvSpPr>
-        <p:spPr>
-          <a:xfrm>
-            <a:off x="9634484" y="4901184"/>
-            <a:ext cx="2054291" cy="384048"/>
-          </a:xfrm>
-          <a:prstGeom prst="rect">
-            <a:avLst/>
-          </a:prstGeom>
-          <a:solidFill>
-            <a:srgbClr val="E6EEF5"/>
-          </a:solidFill>
-          <a:ln>
-            <a:noFill/>
-          </a:ln>
-        </p:spPr>
-        <p:style>
-          <a:lnRef idx="1">
-            <a:schemeClr val="accent1"/>
-          </a:lnRef>
-          <a:fillRef idx="3">
-            <a:schemeClr val="accent1"/>
-          </a:fillRef>
-          <a:effectRef idx="2">
-            <a:schemeClr val="accent1"/>
-          </a:effectRef>
-          <a:fontRef idx="minor">
-            <a:schemeClr val="lt1"/>
-          </a:fontRef>
-        </p:style>
-        <p:txBody>
-          <a:bodyPr rtlCol="0" anchor="ctr"/>
-          <a:lstStyle/>
-          <a:p>
-            <a:pPr algn="ctr"/>
-          </a:p>
-        </p:txBody>
-      </p:sp>
-      <p:sp>
-        <p:nvSpPr>
-          <p:cNvPr id="64" name="TextBox 63"/>
-          <p:cNvSpPr txBox="1"/>
-          <p:nvPr/>
-        </p:nvSpPr>
-        <p:spPr>
-          <a:xfrm>
-            <a:off x="9680204" y="4919472"/>
-            <a:ext cx="1962851" cy="384048"/>
-          </a:xfrm>
-          <a:prstGeom prst="rect">
-            <a:avLst/>
-          </a:prstGeom>
-          <a:noFill/>
-        </p:spPr>
-        <p:txBody>
-          <a:bodyPr wrap="square">
-            <a:spAutoFit/>
-          </a:bodyPr>
-          <a:lstStyle/>
-          <a:p>
-            <a:pPr>
-              <a:defRPr sz="900" b="1">
-                <a:solidFill>
-                  <a:srgbClr val="1D1D4D"/>
-                </a:solidFill>
-              </a:defRPr>
-            </a:pPr>
-            <a:r>
-              <a:t>#21 MGS-13086</a:t>
-            </a:r>
-          </a:p>
-          <a:p>
-            <a:pPr>
-              <a:defRPr sz="800">
-                <a:solidFill>
-                  <a:srgbClr val="5C5C7A"/>
-                </a:solidFill>
-              </a:defRPr>
-            </a:pPr>
-            <a:r>
-              <a:t>Improve MAP email templates</a:t>
-            </a:r>
-          </a:p>
-        </p:txBody>
-      </p:sp>
-      <p:sp>
-        <p:nvSpPr>
-          <p:cNvPr id="65" name="Rectangle 64"/>
-          <p:cNvSpPr/>
-          <p:nvPr/>
-        </p:nvSpPr>
-        <p:spPr>
-          <a:xfrm>
-            <a:off x="9634484" y="5285232"/>
-            <a:ext cx="2054291" cy="384048"/>
-          </a:xfrm>
-          <a:prstGeom prst="rect">
-            <a:avLst/>
-          </a:prstGeom>
-          <a:solidFill>
-            <a:srgbClr val="FFFFFF"/>
-          </a:solidFill>
-          <a:ln>
-            <a:noFill/>
-          </a:ln>
-        </p:spPr>
-        <p:style>
-          <a:lnRef idx="1">
-            <a:schemeClr val="accent1"/>
-          </a:lnRef>
-          <a:fillRef idx="3">
-            <a:schemeClr val="accent1"/>
-          </a:fillRef>
-          <a:effectRef idx="2">
-            <a:schemeClr val="accent1"/>
-          </a:effectRef>
-          <a:fontRef idx="minor">
-            <a:schemeClr val="lt1"/>
-          </a:fontRef>
-        </p:style>
-        <p:txBody>
-          <a:bodyPr rtlCol="0" anchor="ctr"/>
-          <a:lstStyle/>
-          <a:p>
-            <a:pPr algn="ctr"/>
-          </a:p>
-        </p:txBody>
-      </p:sp>
-      <p:sp>
-        <p:nvSpPr>
-          <p:cNvPr id="66" name="TextBox 65"/>
-          <p:cNvSpPr txBox="1"/>
-          <p:nvPr/>
-        </p:nvSpPr>
-        <p:spPr>
-          <a:xfrm>
-            <a:off x="9680204" y="5303520"/>
-            <a:ext cx="1962851" cy="384048"/>
-          </a:xfrm>
-          <a:prstGeom prst="rect">
-            <a:avLst/>
-          </a:prstGeom>
-          <a:noFill/>
-        </p:spPr>
-        <p:txBody>
-          <a:bodyPr wrap="square">
-            <a:spAutoFit/>
-          </a:bodyPr>
-          <a:lstStyle/>
-          <a:p>
-            <a:pPr>
-              <a:defRPr sz="900" b="1">
-                <a:solidFill>
-                  <a:srgbClr val="1D1D4D"/>
-                </a:solidFill>
-              </a:defRPr>
-            </a:pPr>
-            <a:r>
-              <a:t>#22 MGS-13083</a:t>
-            </a:r>
-          </a:p>
-          <a:p>
-            <a:pPr>
-              <a:defRPr sz="800">
-                <a:solidFill>
-                  <a:srgbClr val="5C5C7A"/>
-                </a:solidFill>
-              </a:defRPr>
-            </a:pPr>
-            <a:r>
-              <a:t>Improve wording of MAP chaser emails</a:t>
-            </a:r>
-          </a:p>
-        </p:txBody>
-      </p:sp>
-      <p:sp>
-        <p:nvSpPr>
-          <p:cNvPr id="67" name="TextBox 66"/>
-          <p:cNvSpPr txBox="1"/>
-          <p:nvPr/>
-        </p:nvSpPr>
-        <p:spPr>
-          <a:xfrm>
-            <a:off x="9588764" y="5440680"/>
-            <a:ext cx="2145731" cy="274320"/>
-          </a:xfrm>
-          <a:prstGeom prst="rect">
-            <a:avLst/>
-          </a:prstGeom>
-          <a:noFill/>
-        </p:spPr>
-        <p:txBody>
-          <a:bodyPr wrap="none">
-            <a:spAutoFit/>
-          </a:bodyPr>
-          <a:lstStyle/>
-          <a:p>
-            <a:pPr algn="ctr">
-              <a:defRPr sz="900" i="1">
-                <a:solidFill>
-                  <a:srgbClr val="5C5C7A"/>
-                </a:solidFill>
-              </a:defRPr>
-            </a:pPr>
-            <a:r>
-              <a:t>+9 more</a:t>
+              <a:t>+7 more items</a:t>
             </a:r>
           </a:p>
         </p:txBody>

</xml_diff>

<commit_message>
Taller rows for full summaries, added Jira link
</commit_message>
<xml_diff>
--- a/Delivery_Roadmap_Template_v2.pptx
+++ b/Delivery_Roadmap_Template_v2.pptx
@@ -4462,7 +4462,7 @@
         <p:spPr>
           <a:xfrm>
             <a:off x="457200" y="1188720"/>
-            <a:ext cx="2109155" cy="5084064"/>
+            <a:ext cx="2109155" cy="5303520"/>
           </a:xfrm>
           <a:prstGeom prst="roundRect">
             <a:avLst/>
@@ -4585,7 +4585,7 @@
         <p:spPr>
           <a:xfrm>
             <a:off x="566928" y="1828800"/>
-            <a:ext cx="1889699" cy="347472"/>
+            <a:ext cx="1889699" cy="438912"/>
           </a:xfrm>
           <a:prstGeom prst="rect">
             <a:avLst/>
@@ -4599,14 +4599,26 @@
           <a:lstStyle/>
           <a:p>
             <a:pPr>
-              <a:defRPr sz="800">
+              <a:defRPr sz="800" b="1">
                 <a:solidFill>
                   <a:srgbClr val="1D1D4D"/>
                 </a:solidFill>
               </a:defRPr>
             </a:pPr>
             <a:r>
-              <a:t>MGS-12826: Enhance OLBM document upload...</a:t>
+              <a:t>MGS-12826</a:t>
+            </a:r>
+          </a:p>
+          <a:p>
+            <a:pPr>
+              <a:defRPr sz="700">
+                <a:solidFill>
+                  <a:srgbClr val="5C5C7A"/>
+                </a:solidFill>
+              </a:defRPr>
+            </a:pPr>
+            <a:r>
+              <a:t>Enhance OLBM document upload messaging for case types</a:t>
             </a:r>
           </a:p>
         </p:txBody>
@@ -4619,8 +4631,8 @@
         </p:nvSpPr>
         <p:spPr>
           <a:xfrm>
-            <a:off x="566928" y="2176272"/>
-            <a:ext cx="1889699" cy="347472"/>
+            <a:off x="566928" y="2267712"/>
+            <a:ext cx="1889699" cy="438912"/>
           </a:xfrm>
           <a:prstGeom prst="rect">
             <a:avLst/>
@@ -4634,14 +4646,26 @@
           <a:lstStyle/>
           <a:p>
             <a:pPr>
-              <a:defRPr sz="800">
+              <a:defRPr sz="800" b="1">
                 <a:solidFill>
                   <a:srgbClr val="1D1D4D"/>
                 </a:solidFill>
               </a:defRPr>
             </a:pPr>
             <a:r>
-              <a:t>MGS-12838: Phase 2a - Product fee and LTV...</a:t>
+              <a:t>MGS-12838</a:t>
+            </a:r>
+          </a:p>
+          <a:p>
+            <a:pPr>
+              <a:defRPr sz="700">
+                <a:solidFill>
+                  <a:srgbClr val="5C5C7A"/>
+                </a:solidFill>
+              </a:defRPr>
+            </a:pPr>
+            <a:r>
+              <a:t>Phase 2a - Product fee and LTV Enhancements</a:t>
             </a:r>
           </a:p>
         </p:txBody>
@@ -4655,7 +4679,7 @@
         <p:spPr>
           <a:xfrm>
             <a:off x="2749235" y="1188720"/>
-            <a:ext cx="2109155" cy="5084064"/>
+            <a:ext cx="2109155" cy="5303520"/>
           </a:xfrm>
           <a:prstGeom prst="roundRect">
             <a:avLst/>
@@ -4778,7 +4802,7 @@
         <p:spPr>
           <a:xfrm>
             <a:off x="2858963" y="1828800"/>
-            <a:ext cx="1889699" cy="347472"/>
+            <a:ext cx="1889699" cy="438912"/>
           </a:xfrm>
           <a:prstGeom prst="rect">
             <a:avLst/>
@@ -4792,14 +4816,26 @@
           <a:lstStyle/>
           <a:p>
             <a:pPr>
-              <a:defRPr sz="800">
+              <a:defRPr sz="800" b="1">
                 <a:solidFill>
                   <a:srgbClr val="1D1D4D"/>
                 </a:solidFill>
               </a:defRPr>
             </a:pPr>
             <a:r>
-              <a:t>MGS-12833: Enhance document upload capabilities</a:t>
+              <a:t>MGS-12833</a:t>
+            </a:r>
+          </a:p>
+          <a:p>
+            <a:pPr>
+              <a:defRPr sz="700">
+                <a:solidFill>
+                  <a:srgbClr val="5C5C7A"/>
+                </a:solidFill>
+              </a:defRPr>
+            </a:pPr>
+            <a:r>
+              <a:t>Enhance document upload capabilities</a:t>
             </a:r>
           </a:p>
         </p:txBody>
@@ -4812,8 +4848,8 @@
         </p:nvSpPr>
         <p:spPr>
           <a:xfrm>
-            <a:off x="2858963" y="2176272"/>
-            <a:ext cx="1889699" cy="347472"/>
+            <a:off x="2858963" y="2267712"/>
+            <a:ext cx="1889699" cy="438912"/>
           </a:xfrm>
           <a:prstGeom prst="rect">
             <a:avLst/>
@@ -4827,14 +4863,26 @@
           <a:lstStyle/>
           <a:p>
             <a:pPr>
-              <a:defRPr sz="800">
+              <a:defRPr sz="800" b="1">
                 <a:solidFill>
                   <a:srgbClr val="1D1D4D"/>
                 </a:solidFill>
               </a:defRPr>
             </a:pPr>
             <a:r>
-              <a:t>MGS-12830: DD Bank validation ESB Service</a:t>
+              <a:t>MGS-12830</a:t>
+            </a:r>
+          </a:p>
+          <a:p>
+            <a:pPr>
+              <a:defRPr sz="700">
+                <a:solidFill>
+                  <a:srgbClr val="5C5C7A"/>
+                </a:solidFill>
+              </a:defRPr>
+            </a:pPr>
+            <a:r>
+              <a:t>DD Bank validation ESB Service</a:t>
             </a:r>
           </a:p>
         </p:txBody>
@@ -4847,8 +4895,8 @@
         </p:nvSpPr>
         <p:spPr>
           <a:xfrm>
-            <a:off x="2858963" y="2523744"/>
-            <a:ext cx="1889699" cy="347472"/>
+            <a:off x="2858963" y="2706624"/>
+            <a:ext cx="1889699" cy="438912"/>
           </a:xfrm>
           <a:prstGeom prst="rect">
             <a:avLst/>
@@ -4862,14 +4910,26 @@
           <a:lstStyle/>
           <a:p>
             <a:pPr>
-              <a:defRPr sz="800">
+              <a:defRPr sz="800" b="1">
                 <a:solidFill>
                   <a:srgbClr val="1D1D4D"/>
                 </a:solidFill>
               </a:defRPr>
             </a:pPr>
             <a:r>
-              <a:t>MGS-12842: CRA enhancements - June target</a:t>
+              <a:t>MGS-12842</a:t>
+            </a:r>
+          </a:p>
+          <a:p>
+            <a:pPr>
+              <a:defRPr sz="700">
+                <a:solidFill>
+                  <a:srgbClr val="5C5C7A"/>
+                </a:solidFill>
+              </a:defRPr>
+            </a:pPr>
+            <a:r>
+              <a:t>CRA enhancements - June target</a:t>
             </a:r>
           </a:p>
         </p:txBody>
@@ -4882,8 +4942,8 @@
         </p:nvSpPr>
         <p:spPr>
           <a:xfrm>
-            <a:off x="2858963" y="2871216"/>
-            <a:ext cx="1889699" cy="347472"/>
+            <a:off x="2858963" y="3145536"/>
+            <a:ext cx="1889699" cy="438912"/>
           </a:xfrm>
           <a:prstGeom prst="rect">
             <a:avLst/>
@@ -4897,14 +4957,26 @@
           <a:lstStyle/>
           <a:p>
             <a:pPr>
-              <a:defRPr sz="800">
+              <a:defRPr sz="800" b="1">
                 <a:solidFill>
                   <a:srgbClr val="1D1D4D"/>
                 </a:solidFill>
               </a:defRPr>
             </a:pPr>
             <a:r>
-              <a:t>MGS-13102: Prevent Special Characters entered...</a:t>
+              <a:t>MGS-13102</a:t>
+            </a:r>
+          </a:p>
+          <a:p>
+            <a:pPr>
+              <a:defRPr sz="700">
+                <a:solidFill>
+                  <a:srgbClr val="5C5C7A"/>
+                </a:solidFill>
+              </a:defRPr>
+            </a:pPr>
+            <a:r>
+              <a:t>Prevent Special Characters entered in OLBM causing robots to fail</a:t>
             </a:r>
           </a:p>
         </p:txBody>
@@ -4917,8 +4989,8 @@
         </p:nvSpPr>
         <p:spPr>
           <a:xfrm>
-            <a:off x="2858963" y="3218688"/>
-            <a:ext cx="1889699" cy="347472"/>
+            <a:off x="2858963" y="3584448"/>
+            <a:ext cx="1889699" cy="438912"/>
           </a:xfrm>
           <a:prstGeom prst="rect">
             <a:avLst/>
@@ -4932,14 +5004,26 @@
           <a:lstStyle/>
           <a:p>
             <a:pPr>
-              <a:defRPr sz="800">
+              <a:defRPr sz="800" b="1">
                 <a:solidFill>
                   <a:srgbClr val="1D1D4D"/>
                 </a:solidFill>
               </a:defRPr>
             </a:pPr>
             <a:r>
-              <a:t>MGS-13079: Remove restriction on CC seeing...</a:t>
+              <a:t>MGS-13079</a:t>
+            </a:r>
+          </a:p>
+          <a:p>
+            <a:pPr>
+              <a:defRPr sz="700">
+                <a:solidFill>
+                  <a:srgbClr val="5C5C7A"/>
+                </a:solidFill>
+              </a:defRPr>
+            </a:pPr>
+            <a:r>
+              <a:t>Remove restriction on CC seeing property valuation details</a:t>
             </a:r>
           </a:p>
         </p:txBody>
@@ -4953,7 +5037,7 @@
         <p:spPr>
           <a:xfrm>
             <a:off x="5041270" y="1188720"/>
-            <a:ext cx="2109155" cy="5084064"/>
+            <a:ext cx="2109155" cy="5303520"/>
           </a:xfrm>
           <a:prstGeom prst="roundRect">
             <a:avLst/>
@@ -5076,7 +5160,7 @@
         <p:spPr>
           <a:xfrm>
             <a:off x="5150998" y="1828800"/>
-            <a:ext cx="1889699" cy="347472"/>
+            <a:ext cx="1889699" cy="438912"/>
           </a:xfrm>
           <a:prstGeom prst="rect">
             <a:avLst/>
@@ -5090,14 +5174,26 @@
           <a:lstStyle/>
           <a:p>
             <a:pPr>
-              <a:defRPr sz="800">
+              <a:defRPr sz="800" b="1">
                 <a:solidFill>
                   <a:srgbClr val="1D1D4D"/>
                 </a:solidFill>
               </a:defRPr>
             </a:pPr>
             <a:r>
-              <a:t>MGS-13098: Increase levels of robot validation</a:t>
+              <a:t>MGS-13098</a:t>
+            </a:r>
+          </a:p>
+          <a:p>
+            <a:pPr>
+              <a:defRPr sz="700">
+                <a:solidFill>
+                  <a:srgbClr val="5C5C7A"/>
+                </a:solidFill>
+              </a:defRPr>
+            </a:pPr>
+            <a:r>
+              <a:t>Increase levels of robot validation</a:t>
             </a:r>
           </a:p>
         </p:txBody>
@@ -5110,8 +5206,8 @@
         </p:nvSpPr>
         <p:spPr>
           <a:xfrm>
-            <a:off x="5150998" y="2176272"/>
-            <a:ext cx="1889699" cy="347472"/>
+            <a:off x="5150998" y="2267712"/>
+            <a:ext cx="1889699" cy="438912"/>
           </a:xfrm>
           <a:prstGeom prst="rect">
             <a:avLst/>
@@ -5125,14 +5221,26 @@
           <a:lstStyle/>
           <a:p>
             <a:pPr>
-              <a:defRPr sz="800">
+              <a:defRPr sz="800" b="1">
                 <a:solidFill>
                   <a:srgbClr val="1D1D4D"/>
                 </a:solidFill>
               </a:defRPr>
             </a:pPr>
             <a:r>
-              <a:t>MGS-13105: Robot to park data entry exceptions...</a:t>
+              <a:t>MGS-13105</a:t>
+            </a:r>
+          </a:p>
+          <a:p>
+            <a:pPr>
+              <a:defRPr sz="700">
+                <a:solidFill>
+                  <a:srgbClr val="5C5C7A"/>
+                </a:solidFill>
+              </a:defRPr>
+            </a:pPr>
+            <a:r>
+              <a:t>Robot to park data entry exceptions until all acceptable data entered</a:t>
             </a:r>
           </a:p>
         </p:txBody>
@@ -5145,8 +5253,8 @@
         </p:nvSpPr>
         <p:spPr>
           <a:xfrm>
-            <a:off x="5150998" y="2523744"/>
-            <a:ext cx="1889699" cy="347472"/>
+            <a:off x="5150998" y="2706624"/>
+            <a:ext cx="1889699" cy="438912"/>
           </a:xfrm>
           <a:prstGeom prst="rect">
             <a:avLst/>
@@ -5160,14 +5268,26 @@
           <a:lstStyle/>
           <a:p>
             <a:pPr>
-              <a:defRPr sz="800">
+              <a:defRPr sz="800" b="1">
                 <a:solidFill>
                   <a:srgbClr val="1D1D4D"/>
                 </a:solidFill>
               </a:defRPr>
             </a:pPr>
             <a:r>
-              <a:t>MGS-13077: Remove restriction on BDM seeing...</a:t>
+              <a:t>MGS-13077</a:t>
+            </a:r>
+          </a:p>
+          <a:p>
+            <a:pPr>
+              <a:defRPr sz="700">
+                <a:solidFill>
+                  <a:srgbClr val="5C5C7A"/>
+                </a:solidFill>
+              </a:defRPr>
+            </a:pPr>
+            <a:r>
+              <a:t>Remove restriction on BDM seeing property valuation details</a:t>
             </a:r>
           </a:p>
         </p:txBody>
@@ -5180,8 +5300,8 @@
         </p:nvSpPr>
         <p:spPr>
           <a:xfrm>
-            <a:off x="5150998" y="2871216"/>
-            <a:ext cx="1889699" cy="347472"/>
+            <a:off x="5150998" y="3145536"/>
+            <a:ext cx="1889699" cy="438912"/>
           </a:xfrm>
           <a:prstGeom prst="rect">
             <a:avLst/>
@@ -5195,14 +5315,26 @@
           <a:lstStyle/>
           <a:p>
             <a:pPr>
-              <a:defRPr sz="800">
+              <a:defRPr sz="800" b="1">
                 <a:solidFill>
                   <a:srgbClr val="1D1D4D"/>
                 </a:solidFill>
               </a:defRPr>
             </a:pPr>
             <a:r>
-              <a:t>MGS-13070: Make case status visible in Case...</a:t>
+              <a:t>MGS-13070</a:t>
+            </a:r>
+          </a:p>
+          <a:p>
+            <a:pPr>
+              <a:defRPr sz="700">
+                <a:solidFill>
+                  <a:srgbClr val="5C5C7A"/>
+                </a:solidFill>
+              </a:defRPr>
+            </a:pPr>
+            <a:r>
+              <a:t>Make case status visible in Case Tracker</a:t>
             </a:r>
           </a:p>
         </p:txBody>
@@ -5215,8 +5347,8 @@
         </p:nvSpPr>
         <p:spPr>
           <a:xfrm>
-            <a:off x="5150998" y="3218688"/>
-            <a:ext cx="1889699" cy="347472"/>
+            <a:off x="5150998" y="3584448"/>
+            <a:ext cx="1889699" cy="438912"/>
           </a:xfrm>
           <a:prstGeom prst="rect">
             <a:avLst/>
@@ -5230,14 +5362,26 @@
           <a:lstStyle/>
           <a:p>
             <a:pPr>
-              <a:defRPr sz="800">
+              <a:defRPr sz="800" b="1">
                 <a:solidFill>
                   <a:srgbClr val="1D1D4D"/>
                 </a:solidFill>
               </a:defRPr>
             </a:pPr>
             <a:r>
-              <a:t>MGS-12827: Remove Valuation Visibility...</a:t>
+              <a:t>MGS-12827</a:t>
+            </a:r>
+          </a:p>
+          <a:p>
+            <a:pPr>
+              <a:defRPr sz="700">
+                <a:solidFill>
+                  <a:srgbClr val="5C5C7A"/>
+                </a:solidFill>
+              </a:defRPr>
+            </a:pPr>
+            <a:r>
+              <a:t>Remove Valuation Visibility Restrictions</a:t>
             </a:r>
           </a:p>
         </p:txBody>
@@ -5251,7 +5395,7 @@
         <p:spPr>
           <a:xfrm>
             <a:off x="7333305" y="1188720"/>
-            <a:ext cx="2109155" cy="5084064"/>
+            <a:ext cx="2109155" cy="5303520"/>
           </a:xfrm>
           <a:prstGeom prst="roundRect">
             <a:avLst/>
@@ -5374,7 +5518,7 @@
         <p:spPr>
           <a:xfrm>
             <a:off x="7443033" y="1828800"/>
-            <a:ext cx="1889699" cy="347472"/>
+            <a:ext cx="1889699" cy="438912"/>
           </a:xfrm>
           <a:prstGeom prst="rect">
             <a:avLst/>
@@ -5388,14 +5532,26 @@
           <a:lstStyle/>
           <a:p>
             <a:pPr>
-              <a:defRPr sz="800">
+              <a:defRPr sz="800" b="1">
                 <a:solidFill>
                   <a:srgbClr val="1D1D4D"/>
                 </a:solidFill>
               </a:defRPr>
             </a:pPr>
             <a:r>
-              <a:t>MGS-12832: Existing Customer Online Application</a:t>
+              <a:t>MGS-12832</a:t>
+            </a:r>
+          </a:p>
+          <a:p>
+            <a:pPr>
+              <a:defRPr sz="700">
+                <a:solidFill>
+                  <a:srgbClr val="5C5C7A"/>
+                </a:solidFill>
+              </a:defRPr>
+            </a:pPr>
+            <a:r>
+              <a:t>Existing Customer Online Application</a:t>
             </a:r>
           </a:p>
         </p:txBody>
@@ -5408,8 +5564,8 @@
         </p:nvSpPr>
         <p:spPr>
           <a:xfrm>
-            <a:off x="7443033" y="2176272"/>
-            <a:ext cx="1889699" cy="347472"/>
+            <a:off x="7443033" y="2267712"/>
+            <a:ext cx="1889699" cy="438912"/>
           </a:xfrm>
           <a:prstGeom prst="rect">
             <a:avLst/>
@@ -5423,14 +5579,26 @@
           <a:lstStyle/>
           <a:p>
             <a:pPr>
-              <a:defRPr sz="800">
+              <a:defRPr sz="800" b="1">
                 <a:solidFill>
                   <a:srgbClr val="1D1D4D"/>
                 </a:solidFill>
               </a:defRPr>
             </a:pPr>
             <a:r>
-              <a:t>MGS-12831: Worldpay to Global Pay</a:t>
+              <a:t>MGS-12831</a:t>
+            </a:r>
+          </a:p>
+          <a:p>
+            <a:pPr>
+              <a:defRPr sz="700">
+                <a:solidFill>
+                  <a:srgbClr val="5C5C7A"/>
+                </a:solidFill>
+              </a:defRPr>
+            </a:pPr>
+            <a:r>
+              <a:t>Worldpay to Global Pay</a:t>
             </a:r>
           </a:p>
         </p:txBody>
@@ -5444,7 +5612,7 @@
         <p:spPr>
           <a:xfrm>
             <a:off x="9625340" y="1188720"/>
-            <a:ext cx="2109155" cy="5084064"/>
+            <a:ext cx="2109155" cy="5303520"/>
           </a:xfrm>
           <a:prstGeom prst="roundRect">
             <a:avLst/>
@@ -5567,7 +5735,7 @@
         <p:spPr>
           <a:xfrm>
             <a:off x="9735068" y="1828800"/>
-            <a:ext cx="1889699" cy="347472"/>
+            <a:ext cx="1889699" cy="438912"/>
           </a:xfrm>
           <a:prstGeom prst="rect">
             <a:avLst/>
@@ -5581,14 +5749,26 @@
           <a:lstStyle/>
           <a:p>
             <a:pPr>
-              <a:defRPr sz="800">
+              <a:defRPr sz="800" b="1">
                 <a:solidFill>
                   <a:srgbClr val="1D1D4D"/>
                 </a:solidFill>
               </a:defRPr>
             </a:pPr>
             <a:r>
-              <a:t>MGS-13067: Create new fields to identify...</a:t>
+              <a:t>MGS-13067</a:t>
+            </a:r>
+          </a:p>
+          <a:p>
+            <a:pPr>
+              <a:defRPr sz="700">
+                <a:solidFill>
+                  <a:srgbClr val="5C5C7A"/>
+                </a:solidFill>
+              </a:defRPr>
+            </a:pPr>
+            <a:r>
+              <a:t>Create new fields to identify Second/Holiday Home's and pass data to PCO</a:t>
             </a:r>
           </a:p>
         </p:txBody>
@@ -5601,8 +5781,8 @@
         </p:nvSpPr>
         <p:spPr>
           <a:xfrm>
-            <a:off x="9735068" y="2176272"/>
-            <a:ext cx="1889699" cy="347472"/>
+            <a:off x="9735068" y="2267712"/>
+            <a:ext cx="1889699" cy="438912"/>
           </a:xfrm>
           <a:prstGeom prst="rect">
             <a:avLst/>
@@ -5616,14 +5796,26 @@
           <a:lstStyle/>
           <a:p>
             <a:pPr>
-              <a:defRPr sz="800">
+              <a:defRPr sz="800" b="1">
                 <a:solidFill>
                   <a:srgbClr val="1D1D4D"/>
                 </a:solidFill>
               </a:defRPr>
             </a:pPr>
             <a:r>
-              <a:t>MGS-13066: Create Variable Income fields and...</a:t>
+              <a:t>MGS-13066</a:t>
+            </a:r>
+          </a:p>
+          <a:p>
+            <a:pPr>
+              <a:defRPr sz="700">
+                <a:solidFill>
+                  <a:srgbClr val="5C5C7A"/>
+                </a:solidFill>
+              </a:defRPr>
+            </a:pPr>
+            <a:r>
+              <a:t>Create Variable Income fields and pass data to PCO</a:t>
             </a:r>
           </a:p>
         </p:txBody>
@@ -5636,8 +5828,8 @@
         </p:nvSpPr>
         <p:spPr>
           <a:xfrm>
-            <a:off x="9735068" y="2523744"/>
-            <a:ext cx="1889699" cy="347472"/>
+            <a:off x="9735068" y="2706624"/>
+            <a:ext cx="1889699" cy="438912"/>
           </a:xfrm>
           <a:prstGeom prst="rect">
             <a:avLst/>
@@ -5651,14 +5843,26 @@
           <a:lstStyle/>
           <a:p>
             <a:pPr>
-              <a:defRPr sz="800">
+              <a:defRPr sz="800" b="1">
                 <a:solidFill>
                   <a:srgbClr val="1D1D4D"/>
                 </a:solidFill>
               </a:defRPr>
             </a:pPr>
             <a:r>
-              <a:t>MGS-13062: Create new fields for Joint...</a:t>
+              <a:t>MGS-13062</a:t>
+            </a:r>
+          </a:p>
+          <a:p>
+            <a:pPr>
+              <a:defRPr sz="700">
+                <a:solidFill>
+                  <a:srgbClr val="5C5C7A"/>
+                </a:solidFill>
+              </a:defRPr>
+            </a:pPr>
+            <a:r>
+              <a:t>Create new fields for Joint Borrower Sole Owner cases and pass to PCO</a:t>
             </a:r>
           </a:p>
         </p:txBody>
@@ -5671,8 +5875,8 @@
         </p:nvSpPr>
         <p:spPr>
           <a:xfrm>
-            <a:off x="9735068" y="2871216"/>
-            <a:ext cx="1889699" cy="347472"/>
+            <a:off x="9735068" y="3145536"/>
+            <a:ext cx="1889699" cy="438912"/>
           </a:xfrm>
           <a:prstGeom prst="rect">
             <a:avLst/>
@@ -5686,14 +5890,26 @@
           <a:lstStyle/>
           <a:p>
             <a:pPr>
-              <a:defRPr sz="800">
+              <a:defRPr sz="800" b="1">
                 <a:solidFill>
                   <a:srgbClr val="1D1D4D"/>
                 </a:solidFill>
               </a:defRPr>
             </a:pPr>
             <a:r>
-              <a:t>MGS-13063: Create additional fields for Self...</a:t>
+              <a:t>MGS-13063</a:t>
+            </a:r>
+          </a:p>
+          <a:p>
+            <a:pPr>
+              <a:defRPr sz="700">
+                <a:solidFill>
+                  <a:srgbClr val="5C5C7A"/>
+                </a:solidFill>
+              </a:defRPr>
+            </a:pPr>
+            <a:r>
+              <a:t>Create additional fields for Self Employed (Main Income)</a:t>
             </a:r>
           </a:p>
         </p:txBody>
@@ -5706,8 +5922,8 @@
         </p:nvSpPr>
         <p:spPr>
           <a:xfrm>
-            <a:off x="9735068" y="3218688"/>
-            <a:ext cx="1889699" cy="347472"/>
+            <a:off x="9735068" y="3584448"/>
+            <a:ext cx="1889699" cy="438912"/>
           </a:xfrm>
           <a:prstGeom prst="rect">
             <a:avLst/>
@@ -5721,14 +5937,26 @@
           <a:lstStyle/>
           <a:p>
             <a:pPr>
-              <a:defRPr sz="800">
+              <a:defRPr sz="800" b="1">
                 <a:solidFill>
                   <a:srgbClr val="1D1D4D"/>
                 </a:solidFill>
               </a:defRPr>
             </a:pPr>
             <a:r>
-              <a:t>MGS-12823: Create Secondary Income fields and...</a:t>
+              <a:t>MGS-12823</a:t>
+            </a:r>
+          </a:p>
+          <a:p>
+            <a:pPr>
+              <a:defRPr sz="700">
+                <a:solidFill>
+                  <a:srgbClr val="5C5C7A"/>
+                </a:solidFill>
+              </a:defRPr>
+            </a:pPr>
+            <a:r>
+              <a:t>Create Secondary Income fields and pass to PCO</a:t>
             </a:r>
           </a:p>
         </p:txBody>
@@ -5741,8 +5969,8 @@
         </p:nvSpPr>
         <p:spPr>
           <a:xfrm>
-            <a:off x="9735068" y="3566160"/>
-            <a:ext cx="1889699" cy="347472"/>
+            <a:off x="9735068" y="4023360"/>
+            <a:ext cx="1889699" cy="438912"/>
           </a:xfrm>
           <a:prstGeom prst="rect">
             <a:avLst/>
@@ -5756,14 +5984,26 @@
           <a:lstStyle/>
           <a:p>
             <a:pPr>
-              <a:defRPr sz="800">
+              <a:defRPr sz="800" b="1">
                 <a:solidFill>
                   <a:srgbClr val="1D1D4D"/>
                 </a:solidFill>
               </a:defRPr>
             </a:pPr>
             <a:r>
-              <a:t>MGS-13096: Improve clarity of messages in...</a:t>
+              <a:t>MGS-13096</a:t>
+            </a:r>
+          </a:p>
+          <a:p>
+            <a:pPr>
+              <a:defRPr sz="700">
+                <a:solidFill>
+                  <a:srgbClr val="5C5C7A"/>
+                </a:solidFill>
+              </a:defRPr>
+            </a:pPr>
+            <a:r>
+              <a:t>Improve clarity of messages in post-document review emails</a:t>
             </a:r>
           </a:p>
         </p:txBody>
@@ -5776,8 +6016,8 @@
         </p:nvSpPr>
         <p:spPr>
           <a:xfrm>
-            <a:off x="9735068" y="3913632"/>
-            <a:ext cx="1889699" cy="347472"/>
+            <a:off x="9735068" y="4462272"/>
+            <a:ext cx="1889699" cy="438912"/>
           </a:xfrm>
           <a:prstGeom prst="rect">
             <a:avLst/>
@@ -5791,14 +6031,26 @@
           <a:lstStyle/>
           <a:p>
             <a:pPr>
-              <a:defRPr sz="800">
+              <a:defRPr sz="800" b="1">
                 <a:solidFill>
                   <a:srgbClr val="1D1D4D"/>
                 </a:solidFill>
               </a:defRPr>
             </a:pPr>
             <a:r>
-              <a:t>MGS-12841: Replacement Mortgage Illustrator...</a:t>
+              <a:t>MGS-12841</a:t>
+            </a:r>
+          </a:p>
+          <a:p>
+            <a:pPr>
+              <a:defRPr sz="700">
+                <a:solidFill>
+                  <a:srgbClr val="5C5C7A"/>
+                </a:solidFill>
+              </a:defRPr>
+            </a:pPr>
+            <a:r>
+              <a:t>Replacement Mortgage Illustrator tool</a:t>
             </a:r>
           </a:p>
         </p:txBody>
@@ -5811,8 +6063,8 @@
         </p:nvSpPr>
         <p:spPr>
           <a:xfrm>
-            <a:off x="9735068" y="4261104"/>
-            <a:ext cx="1889699" cy="347472"/>
+            <a:off x="9735068" y="4901184"/>
+            <a:ext cx="1889699" cy="438912"/>
           </a:xfrm>
           <a:prstGeom prst="rect">
             <a:avLst/>
@@ -5826,14 +6078,26 @@
           <a:lstStyle/>
           <a:p>
             <a:pPr>
-              <a:defRPr sz="800">
+              <a:defRPr sz="800" b="1">
                 <a:solidFill>
                   <a:srgbClr val="1D1D4D"/>
                 </a:solidFill>
               </a:defRPr>
             </a:pPr>
             <a:r>
-              <a:t>MGS-13092: Add date of valuation to MAP chaser...</a:t>
+              <a:t>MGS-13092</a:t>
+            </a:r>
+          </a:p>
+          <a:p>
+            <a:pPr>
+              <a:defRPr sz="700">
+                <a:solidFill>
+                  <a:srgbClr val="5C5C7A"/>
+                </a:solidFill>
+              </a:defRPr>
+            </a:pPr>
+            <a:r>
+              <a:t>Add date of valuation to MAP chaser letter</a:t>
             </a:r>
           </a:p>
         </p:txBody>
@@ -5846,8 +6110,8 @@
         </p:nvSpPr>
         <p:spPr>
           <a:xfrm>
-            <a:off x="9735068" y="4608576"/>
-            <a:ext cx="1889699" cy="347472"/>
+            <a:off x="9735068" y="5340096"/>
+            <a:ext cx="1889699" cy="438912"/>
           </a:xfrm>
           <a:prstGeom prst="rect">
             <a:avLst/>
@@ -5861,154 +6125,61 @@
           <a:lstStyle/>
           <a:p>
             <a:pPr>
-              <a:defRPr sz="800">
+              <a:defRPr sz="800" b="1">
                 <a:solidFill>
                   <a:srgbClr val="1D1D4D"/>
                 </a:solidFill>
               </a:defRPr>
             </a:pPr>
             <a:r>
-              <a:t>MGS-13086: Improve MAP email templates</a:t>
-            </a:r>
-          </a:p>
-        </p:txBody>
-      </p:sp>
-      <p:sp>
-        <p:nvSpPr>
-          <p:cNvPr id="42" name="TextBox 41"/>
-          <p:cNvSpPr txBox="1"/>
-          <p:nvPr/>
-        </p:nvSpPr>
-        <p:spPr>
-          <a:xfrm>
-            <a:off x="9735068" y="4956048"/>
-            <a:ext cx="1889699" cy="347472"/>
-          </a:xfrm>
-          <a:prstGeom prst="rect">
-            <a:avLst/>
-          </a:prstGeom>
-          <a:noFill/>
-        </p:spPr>
-        <p:txBody>
-          <a:bodyPr wrap="square">
-            <a:spAutoFit/>
-          </a:bodyPr>
-          <a:lstStyle/>
+              <a:t>MGS-13086</a:t>
+            </a:r>
+          </a:p>
           <a:p>
             <a:pPr>
-              <a:defRPr sz="800">
-                <a:solidFill>
-                  <a:srgbClr val="1D1D4D"/>
-                </a:solidFill>
-              </a:defRPr>
-            </a:pPr>
-            <a:r>
-              <a:t>MGS-13083: Improve wording of MAP chaser emails</a:t>
-            </a:r>
-          </a:p>
-        </p:txBody>
-      </p:sp>
-      <p:sp>
-        <p:nvSpPr>
-          <p:cNvPr id="43" name="TextBox 42"/>
-          <p:cNvSpPr txBox="1"/>
-          <p:nvPr/>
-        </p:nvSpPr>
-        <p:spPr>
-          <a:xfrm>
-            <a:off x="9735068" y="5303520"/>
-            <a:ext cx="1889699" cy="347472"/>
-          </a:xfrm>
-          <a:prstGeom prst="rect">
-            <a:avLst/>
-          </a:prstGeom>
-          <a:noFill/>
-        </p:spPr>
-        <p:txBody>
-          <a:bodyPr wrap="square">
-            <a:spAutoFit/>
-          </a:bodyPr>
-          <a:lstStyle/>
-          <a:p>
-            <a:pPr>
-              <a:defRPr sz="800">
-                <a:solidFill>
-                  <a:srgbClr val="1D1D4D"/>
-                </a:solidFill>
-              </a:defRPr>
-            </a:pPr>
-            <a:r>
-              <a:t>MGS-13073: Make offer status and timescales...</a:t>
-            </a:r>
-          </a:p>
-        </p:txBody>
-      </p:sp>
-      <p:sp>
-        <p:nvSpPr>
-          <p:cNvPr id="44" name="TextBox 43"/>
-          <p:cNvSpPr txBox="1"/>
-          <p:nvPr/>
-        </p:nvSpPr>
-        <p:spPr>
-          <a:xfrm>
-            <a:off x="9735068" y="5650992"/>
-            <a:ext cx="1889699" cy="347472"/>
-          </a:xfrm>
-          <a:prstGeom prst="rect">
-            <a:avLst/>
-          </a:prstGeom>
-          <a:noFill/>
-        </p:spPr>
-        <p:txBody>
-          <a:bodyPr wrap="square">
-            <a:spAutoFit/>
-          </a:bodyPr>
-          <a:lstStyle/>
-          <a:p>
-            <a:pPr>
-              <a:defRPr sz="800">
-                <a:solidFill>
-                  <a:srgbClr val="1D1D4D"/>
-                </a:solidFill>
-              </a:defRPr>
-            </a:pPr>
-            <a:r>
-              <a:t>MGS-12839: Reduce AIP Queries to Underwriters</a:t>
-            </a:r>
-          </a:p>
-        </p:txBody>
-      </p:sp>
-      <p:sp>
-        <p:nvSpPr>
-          <p:cNvPr id="45" name="TextBox 44"/>
-          <p:cNvSpPr txBox="1"/>
-          <p:nvPr/>
-        </p:nvSpPr>
-        <p:spPr>
-          <a:xfrm>
-            <a:off x="9625340" y="5998464"/>
-            <a:ext cx="2109155" cy="228600"/>
-          </a:xfrm>
-          <a:prstGeom prst="rect">
-            <a:avLst/>
-          </a:prstGeom>
-          <a:noFill/>
-        </p:spPr>
-        <p:txBody>
-          <a:bodyPr wrap="none">
-            <a:spAutoFit/>
-          </a:bodyPr>
-          <a:lstStyle/>
-          <a:p>
-            <a:pPr algn="ctr">
-              <a:defRPr sz="800" i="1">
+              <a:defRPr sz="700">
                 <a:solidFill>
                   <a:srgbClr val="5C5C7A"/>
                 </a:solidFill>
               </a:defRPr>
             </a:pPr>
             <a:r>
-              <a:t>+7 more items</a:t>
+              <a:t>Improve MAP email templates</a:t>
+            </a:r>
+          </a:p>
+        </p:txBody>
+      </p:sp>
+      <p:sp>
+        <p:nvSpPr>
+          <p:cNvPr id="42" name="TextBox 41"/>
+          <p:cNvSpPr txBox="1"/>
+          <p:nvPr/>
+        </p:nvSpPr>
+        <p:spPr>
+          <a:xfrm>
+            <a:off x="9625340" y="6217920"/>
+            <a:ext cx="2109155" cy="228600"/>
+          </a:xfrm>
+          <a:prstGeom prst="rect">
+            <a:avLst/>
+          </a:prstGeom>
+          <a:noFill/>
+        </p:spPr>
+        <p:txBody>
+          <a:bodyPr wrap="none">
+            <a:spAutoFit/>
+          </a:bodyPr>
+          <a:lstStyle/>
+          <a:p>
+            <a:pPr algn="ctr">
+              <a:defRPr sz="700" i="1">
+                <a:solidFill>
+                  <a:srgbClr val="5C5C7A"/>
+                </a:solidFill>
+              </a:defRPr>
+            </a:pPr>
+            <a:r>
+              <a:t>+10 more - see Jira</a:t>
             </a:r>
           </a:p>
         </p:txBody>

</xml_diff>

<commit_message>
Fixed card height to fill slide
</commit_message>
<xml_diff>
--- a/Delivery_Roadmap_Template_v2.pptx
+++ b/Delivery_Roadmap_Template_v2.pptx
@@ -4461,8 +4461,8 @@
         </p:nvSpPr>
         <p:spPr>
           <a:xfrm>
-            <a:off x="457200" y="1188720"/>
-            <a:ext cx="2109155" cy="5303520"/>
+            <a:off x="457200" y="1097280"/>
+            <a:ext cx="2109155" cy="5486400"/>
           </a:xfrm>
           <a:prstGeom prst="roundRect">
             <a:avLst/>
@@ -4506,7 +4506,7 @@
         </p:nvSpPr>
         <p:spPr>
           <a:xfrm>
-            <a:off x="502920" y="1234440"/>
+            <a:off x="502920" y="1143000"/>
             <a:ext cx="2017715" cy="502920"/>
           </a:xfrm>
           <a:prstGeom prst="roundRect">
@@ -4549,7 +4549,7 @@
         </p:nvSpPr>
         <p:spPr>
           <a:xfrm>
-            <a:off x="457200" y="1298448"/>
+            <a:off x="457200" y="1207008"/>
             <a:ext cx="2109155" cy="502920"/>
           </a:xfrm>
           <a:prstGeom prst="rect">
@@ -4584,8 +4584,8 @@
         </p:nvSpPr>
         <p:spPr>
           <a:xfrm>
-            <a:off x="566928" y="1828800"/>
-            <a:ext cx="1889699" cy="438912"/>
+            <a:off x="566928" y="1737360"/>
+            <a:ext cx="1889699" cy="411480"/>
           </a:xfrm>
           <a:prstGeom prst="rect">
             <a:avLst/>
@@ -4631,8 +4631,8 @@
         </p:nvSpPr>
         <p:spPr>
           <a:xfrm>
-            <a:off x="566928" y="2267712"/>
-            <a:ext cx="1889699" cy="438912"/>
+            <a:off x="566928" y="2148840"/>
+            <a:ext cx="1889699" cy="411480"/>
           </a:xfrm>
           <a:prstGeom prst="rect">
             <a:avLst/>
@@ -4678,8 +4678,8 @@
         </p:nvSpPr>
         <p:spPr>
           <a:xfrm>
-            <a:off x="2749235" y="1188720"/>
-            <a:ext cx="2109155" cy="5303520"/>
+            <a:off x="2749235" y="1097280"/>
+            <a:ext cx="2109155" cy="5486400"/>
           </a:xfrm>
           <a:prstGeom prst="roundRect">
             <a:avLst/>
@@ -4723,7 +4723,7 @@
         </p:nvSpPr>
         <p:spPr>
           <a:xfrm>
-            <a:off x="2794955" y="1234440"/>
+            <a:off x="2794955" y="1143000"/>
             <a:ext cx="2017715" cy="502920"/>
           </a:xfrm>
           <a:prstGeom prst="roundRect">
@@ -4766,7 +4766,7 @@
         </p:nvSpPr>
         <p:spPr>
           <a:xfrm>
-            <a:off x="2749235" y="1298448"/>
+            <a:off x="2749235" y="1207008"/>
             <a:ext cx="2109155" cy="502920"/>
           </a:xfrm>
           <a:prstGeom prst="rect">
@@ -4801,8 +4801,8 @@
         </p:nvSpPr>
         <p:spPr>
           <a:xfrm>
-            <a:off x="2858963" y="1828800"/>
-            <a:ext cx="1889699" cy="438912"/>
+            <a:off x="2858963" y="1737360"/>
+            <a:ext cx="1889699" cy="411480"/>
           </a:xfrm>
           <a:prstGeom prst="rect">
             <a:avLst/>
@@ -4848,8 +4848,8 @@
         </p:nvSpPr>
         <p:spPr>
           <a:xfrm>
-            <a:off x="2858963" y="2267712"/>
-            <a:ext cx="1889699" cy="438912"/>
+            <a:off x="2858963" y="2148840"/>
+            <a:ext cx="1889699" cy="411480"/>
           </a:xfrm>
           <a:prstGeom prst="rect">
             <a:avLst/>
@@ -4895,8 +4895,8 @@
         </p:nvSpPr>
         <p:spPr>
           <a:xfrm>
-            <a:off x="2858963" y="2706624"/>
-            <a:ext cx="1889699" cy="438912"/>
+            <a:off x="2858963" y="2560320"/>
+            <a:ext cx="1889699" cy="411480"/>
           </a:xfrm>
           <a:prstGeom prst="rect">
             <a:avLst/>
@@ -4942,8 +4942,8 @@
         </p:nvSpPr>
         <p:spPr>
           <a:xfrm>
-            <a:off x="2858963" y="3145536"/>
-            <a:ext cx="1889699" cy="438912"/>
+            <a:off x="2858963" y="2971800"/>
+            <a:ext cx="1889699" cy="411480"/>
           </a:xfrm>
           <a:prstGeom prst="rect">
             <a:avLst/>
@@ -4989,8 +4989,8 @@
         </p:nvSpPr>
         <p:spPr>
           <a:xfrm>
-            <a:off x="2858963" y="3584448"/>
-            <a:ext cx="1889699" cy="438912"/>
+            <a:off x="2858963" y="3383280"/>
+            <a:ext cx="1889699" cy="411480"/>
           </a:xfrm>
           <a:prstGeom prst="rect">
             <a:avLst/>
@@ -5036,8 +5036,8 @@
         </p:nvSpPr>
         <p:spPr>
           <a:xfrm>
-            <a:off x="5041270" y="1188720"/>
-            <a:ext cx="2109155" cy="5303520"/>
+            <a:off x="5041270" y="1097280"/>
+            <a:ext cx="2109155" cy="5486400"/>
           </a:xfrm>
           <a:prstGeom prst="roundRect">
             <a:avLst/>
@@ -5081,7 +5081,7 @@
         </p:nvSpPr>
         <p:spPr>
           <a:xfrm>
-            <a:off x="5086990" y="1234440"/>
+            <a:off x="5086990" y="1143000"/>
             <a:ext cx="2017715" cy="502920"/>
           </a:xfrm>
           <a:prstGeom prst="roundRect">
@@ -5124,7 +5124,7 @@
         </p:nvSpPr>
         <p:spPr>
           <a:xfrm>
-            <a:off x="5041270" y="1298448"/>
+            <a:off x="5041270" y="1207008"/>
             <a:ext cx="2109155" cy="502920"/>
           </a:xfrm>
           <a:prstGeom prst="rect">
@@ -5159,8 +5159,8 @@
         </p:nvSpPr>
         <p:spPr>
           <a:xfrm>
-            <a:off x="5150998" y="1828800"/>
-            <a:ext cx="1889699" cy="438912"/>
+            <a:off x="5150998" y="1737360"/>
+            <a:ext cx="1889699" cy="411480"/>
           </a:xfrm>
           <a:prstGeom prst="rect">
             <a:avLst/>
@@ -5206,8 +5206,8 @@
         </p:nvSpPr>
         <p:spPr>
           <a:xfrm>
-            <a:off x="5150998" y="2267712"/>
-            <a:ext cx="1889699" cy="438912"/>
+            <a:off x="5150998" y="2148840"/>
+            <a:ext cx="1889699" cy="411480"/>
           </a:xfrm>
           <a:prstGeom prst="rect">
             <a:avLst/>
@@ -5253,8 +5253,8 @@
         </p:nvSpPr>
         <p:spPr>
           <a:xfrm>
-            <a:off x="5150998" y="2706624"/>
-            <a:ext cx="1889699" cy="438912"/>
+            <a:off x="5150998" y="2560320"/>
+            <a:ext cx="1889699" cy="411480"/>
           </a:xfrm>
           <a:prstGeom prst="rect">
             <a:avLst/>
@@ -5300,8 +5300,8 @@
         </p:nvSpPr>
         <p:spPr>
           <a:xfrm>
-            <a:off x="5150998" y="3145536"/>
-            <a:ext cx="1889699" cy="438912"/>
+            <a:off x="5150998" y="2971800"/>
+            <a:ext cx="1889699" cy="411480"/>
           </a:xfrm>
           <a:prstGeom prst="rect">
             <a:avLst/>
@@ -5347,8 +5347,8 @@
         </p:nvSpPr>
         <p:spPr>
           <a:xfrm>
-            <a:off x="5150998" y="3584448"/>
-            <a:ext cx="1889699" cy="438912"/>
+            <a:off x="5150998" y="3383280"/>
+            <a:ext cx="1889699" cy="411480"/>
           </a:xfrm>
           <a:prstGeom prst="rect">
             <a:avLst/>
@@ -5394,8 +5394,8 @@
         </p:nvSpPr>
         <p:spPr>
           <a:xfrm>
-            <a:off x="7333305" y="1188720"/>
-            <a:ext cx="2109155" cy="5303520"/>
+            <a:off x="7333305" y="1097280"/>
+            <a:ext cx="2109155" cy="5486400"/>
           </a:xfrm>
           <a:prstGeom prst="roundRect">
             <a:avLst/>
@@ -5439,7 +5439,7 @@
         </p:nvSpPr>
         <p:spPr>
           <a:xfrm>
-            <a:off x="7379025" y="1234440"/>
+            <a:off x="7379025" y="1143000"/>
             <a:ext cx="2017715" cy="502920"/>
           </a:xfrm>
           <a:prstGeom prst="roundRect">
@@ -5482,7 +5482,7 @@
         </p:nvSpPr>
         <p:spPr>
           <a:xfrm>
-            <a:off x="7333305" y="1298448"/>
+            <a:off x="7333305" y="1207008"/>
             <a:ext cx="2109155" cy="502920"/>
           </a:xfrm>
           <a:prstGeom prst="rect">
@@ -5517,8 +5517,8 @@
         </p:nvSpPr>
         <p:spPr>
           <a:xfrm>
-            <a:off x="7443033" y="1828800"/>
-            <a:ext cx="1889699" cy="438912"/>
+            <a:off x="7443033" y="1737360"/>
+            <a:ext cx="1889699" cy="411480"/>
           </a:xfrm>
           <a:prstGeom prst="rect">
             <a:avLst/>
@@ -5564,8 +5564,8 @@
         </p:nvSpPr>
         <p:spPr>
           <a:xfrm>
-            <a:off x="7443033" y="2267712"/>
-            <a:ext cx="1889699" cy="438912"/>
+            <a:off x="7443033" y="2148840"/>
+            <a:ext cx="1889699" cy="411480"/>
           </a:xfrm>
           <a:prstGeom prst="rect">
             <a:avLst/>
@@ -5611,8 +5611,8 @@
         </p:nvSpPr>
         <p:spPr>
           <a:xfrm>
-            <a:off x="9625340" y="1188720"/>
-            <a:ext cx="2109155" cy="5303520"/>
+            <a:off x="9625340" y="1097280"/>
+            <a:ext cx="2109155" cy="5486400"/>
           </a:xfrm>
           <a:prstGeom prst="roundRect">
             <a:avLst/>
@@ -5656,7 +5656,7 @@
         </p:nvSpPr>
         <p:spPr>
           <a:xfrm>
-            <a:off x="9671060" y="1234440"/>
+            <a:off x="9671060" y="1143000"/>
             <a:ext cx="2017715" cy="502920"/>
           </a:xfrm>
           <a:prstGeom prst="roundRect">
@@ -5699,7 +5699,7 @@
         </p:nvSpPr>
         <p:spPr>
           <a:xfrm>
-            <a:off x="9625340" y="1298448"/>
+            <a:off x="9625340" y="1207008"/>
             <a:ext cx="2109155" cy="502920"/>
           </a:xfrm>
           <a:prstGeom prst="rect">
@@ -5734,8 +5734,8 @@
         </p:nvSpPr>
         <p:spPr>
           <a:xfrm>
-            <a:off x="9735068" y="1828800"/>
-            <a:ext cx="1889699" cy="438912"/>
+            <a:off x="9735068" y="1737360"/>
+            <a:ext cx="1889699" cy="411480"/>
           </a:xfrm>
           <a:prstGeom prst="rect">
             <a:avLst/>
@@ -5781,8 +5781,8 @@
         </p:nvSpPr>
         <p:spPr>
           <a:xfrm>
-            <a:off x="9735068" y="2267712"/>
-            <a:ext cx="1889699" cy="438912"/>
+            <a:off x="9735068" y="2148840"/>
+            <a:ext cx="1889699" cy="411480"/>
           </a:xfrm>
           <a:prstGeom prst="rect">
             <a:avLst/>
@@ -5828,8 +5828,8 @@
         </p:nvSpPr>
         <p:spPr>
           <a:xfrm>
-            <a:off x="9735068" y="2706624"/>
-            <a:ext cx="1889699" cy="438912"/>
+            <a:off x="9735068" y="2560320"/>
+            <a:ext cx="1889699" cy="411480"/>
           </a:xfrm>
           <a:prstGeom prst="rect">
             <a:avLst/>
@@ -5875,8 +5875,8 @@
         </p:nvSpPr>
         <p:spPr>
           <a:xfrm>
-            <a:off x="9735068" y="3145536"/>
-            <a:ext cx="1889699" cy="438912"/>
+            <a:off x="9735068" y="2971800"/>
+            <a:ext cx="1889699" cy="411480"/>
           </a:xfrm>
           <a:prstGeom prst="rect">
             <a:avLst/>
@@ -5922,8 +5922,8 @@
         </p:nvSpPr>
         <p:spPr>
           <a:xfrm>
-            <a:off x="9735068" y="3584448"/>
-            <a:ext cx="1889699" cy="438912"/>
+            <a:off x="9735068" y="3383280"/>
+            <a:ext cx="1889699" cy="411480"/>
           </a:xfrm>
           <a:prstGeom prst="rect">
             <a:avLst/>
@@ -5969,8 +5969,8 @@
         </p:nvSpPr>
         <p:spPr>
           <a:xfrm>
-            <a:off x="9735068" y="4023360"/>
-            <a:ext cx="1889699" cy="438912"/>
+            <a:off x="9735068" y="3794760"/>
+            <a:ext cx="1889699" cy="411480"/>
           </a:xfrm>
           <a:prstGeom prst="rect">
             <a:avLst/>
@@ -6016,8 +6016,8 @@
         </p:nvSpPr>
         <p:spPr>
           <a:xfrm>
-            <a:off x="9735068" y="4462272"/>
-            <a:ext cx="1889699" cy="438912"/>
+            <a:off x="9735068" y="4206240"/>
+            <a:ext cx="1889699" cy="411480"/>
           </a:xfrm>
           <a:prstGeom prst="rect">
             <a:avLst/>
@@ -6063,8 +6063,8 @@
         </p:nvSpPr>
         <p:spPr>
           <a:xfrm>
-            <a:off x="9735068" y="4901184"/>
-            <a:ext cx="1889699" cy="438912"/>
+            <a:off x="9735068" y="4617720"/>
+            <a:ext cx="1889699" cy="411480"/>
           </a:xfrm>
           <a:prstGeom prst="rect">
             <a:avLst/>
@@ -6110,8 +6110,8 @@
         </p:nvSpPr>
         <p:spPr>
           <a:xfrm>
-            <a:off x="9735068" y="5340096"/>
-            <a:ext cx="1889699" cy="438912"/>
+            <a:off x="9735068" y="5029200"/>
+            <a:ext cx="1889699" cy="411480"/>
           </a:xfrm>
           <a:prstGeom prst="rect">
             <a:avLst/>
@@ -6157,8 +6157,8 @@
         </p:nvSpPr>
         <p:spPr>
           <a:xfrm>
-            <a:off x="9625340" y="6217920"/>
-            <a:ext cx="2109155" cy="228600"/>
+            <a:off x="9735068" y="5440680"/>
+            <a:ext cx="1889699" cy="411480"/>
           </a:xfrm>
           <a:prstGeom prst="rect">
             <a:avLst/>
@@ -6166,6 +6166,100 @@
           <a:noFill/>
         </p:spPr>
         <p:txBody>
+          <a:bodyPr wrap="square">
+            <a:spAutoFit/>
+          </a:bodyPr>
+          <a:lstStyle/>
+          <a:p>
+            <a:pPr>
+              <a:defRPr sz="800" b="1">
+                <a:solidFill>
+                  <a:srgbClr val="1D1D4D"/>
+                </a:solidFill>
+              </a:defRPr>
+            </a:pPr>
+            <a:r>
+              <a:t>MGS-13083</a:t>
+            </a:r>
+          </a:p>
+          <a:p>
+            <a:pPr>
+              <a:defRPr sz="700">
+                <a:solidFill>
+                  <a:srgbClr val="5C5C7A"/>
+                </a:solidFill>
+              </a:defRPr>
+            </a:pPr>
+            <a:r>
+              <a:t>Improve wording of MAP chaser emails</a:t>
+            </a:r>
+          </a:p>
+        </p:txBody>
+      </p:sp>
+      <p:sp>
+        <p:nvSpPr>
+          <p:cNvPr id="43" name="TextBox 42"/>
+          <p:cNvSpPr txBox="1"/>
+          <p:nvPr/>
+        </p:nvSpPr>
+        <p:spPr>
+          <a:xfrm>
+            <a:off x="9735068" y="5852160"/>
+            <a:ext cx="1889699" cy="411480"/>
+          </a:xfrm>
+          <a:prstGeom prst="rect">
+            <a:avLst/>
+          </a:prstGeom>
+          <a:noFill/>
+        </p:spPr>
+        <p:txBody>
+          <a:bodyPr wrap="square">
+            <a:spAutoFit/>
+          </a:bodyPr>
+          <a:lstStyle/>
+          <a:p>
+            <a:pPr>
+              <a:defRPr sz="800" b="1">
+                <a:solidFill>
+                  <a:srgbClr val="1D1D4D"/>
+                </a:solidFill>
+              </a:defRPr>
+            </a:pPr>
+            <a:r>
+              <a:t>MGS-13073</a:t>
+            </a:r>
+          </a:p>
+          <a:p>
+            <a:pPr>
+              <a:defRPr sz="700">
+                <a:solidFill>
+                  <a:srgbClr val="5C5C7A"/>
+                </a:solidFill>
+              </a:defRPr>
+            </a:pPr>
+            <a:r>
+              <a:t>Make offer status and timescales visible in OLBM and MAP</a:t>
+            </a:r>
+          </a:p>
+        </p:txBody>
+      </p:sp>
+      <p:sp>
+        <p:nvSpPr>
+          <p:cNvPr id="44" name="TextBox 43"/>
+          <p:cNvSpPr txBox="1"/>
+          <p:nvPr/>
+        </p:nvSpPr>
+        <p:spPr>
+          <a:xfrm>
+            <a:off x="9625340" y="6309360"/>
+            <a:ext cx="2109155" cy="228600"/>
+          </a:xfrm>
+          <a:prstGeom prst="rect">
+            <a:avLst/>
+          </a:prstGeom>
+          <a:noFill/>
+        </p:spPr>
+        <p:txBody>
           <a:bodyPr wrap="none">
             <a:spAutoFit/>
           </a:bodyPr>
@@ -6179,7 +6273,7 @@
               </a:defRPr>
             </a:pPr>
             <a:r>
-              <a:t>+10 more - see Jira</a:t>
+              <a:t>+8 more - see Jira</a:t>
             </a:r>
           </a:p>
         </p:txBody>

</xml_diff>

<commit_message>
Fixed release timeline positions
</commit_message>
<xml_diff>
--- a/Delivery_Roadmap_Template_v2.pptx
+++ b/Delivery_Roadmap_Template_v2.pptx
@@ -3885,7 +3885,7 @@
         </p:nvSpPr>
         <p:spPr>
           <a:xfrm>
-            <a:off x="731520" y="2286000"/>
+            <a:off x="2103120" y="2286000"/>
             <a:ext cx="1005840" cy="502920"/>
           </a:xfrm>
           <a:prstGeom prst="roundRect">
@@ -3928,7 +3928,7 @@
         </p:nvSpPr>
         <p:spPr>
           <a:xfrm>
-            <a:off x="731520" y="2331720"/>
+            <a:off x="2103120" y="2331720"/>
             <a:ext cx="1005840" cy="457200"/>
           </a:xfrm>
           <a:prstGeom prst="rect">
@@ -3967,7 +3967,7 @@
         </p:nvSpPr>
         <p:spPr>
           <a:xfrm>
-            <a:off x="2011680" y="2286000"/>
+            <a:off x="2743200" y="2286000"/>
             <a:ext cx="1005840" cy="502920"/>
           </a:xfrm>
           <a:prstGeom prst="roundRect">
@@ -4010,7 +4010,7 @@
         </p:nvSpPr>
         <p:spPr>
           <a:xfrm>
-            <a:off x="2011680" y="2331720"/>
+            <a:off x="2743200" y="2331720"/>
             <a:ext cx="1005840" cy="457200"/>
           </a:xfrm>
           <a:prstGeom prst="rect">
@@ -4049,7 +4049,7 @@
         </p:nvSpPr>
         <p:spPr>
           <a:xfrm>
-            <a:off x="6217920" y="2286000"/>
+            <a:off x="5303520" y="2286000"/>
             <a:ext cx="1005840" cy="502920"/>
           </a:xfrm>
           <a:prstGeom prst="roundRect">
@@ -4092,7 +4092,7 @@
         </p:nvSpPr>
         <p:spPr>
           <a:xfrm>
-            <a:off x="6217920" y="2331720"/>
+            <a:off x="5303520" y="2331720"/>
             <a:ext cx="1005840" cy="457200"/>
           </a:xfrm>
           <a:prstGeom prst="rect">
@@ -4131,7 +4131,7 @@
         </p:nvSpPr>
         <p:spPr>
           <a:xfrm>
-            <a:off x="8961120" y="2286000"/>
+            <a:off x="7132320" y="2286000"/>
             <a:ext cx="1005840" cy="502920"/>
           </a:xfrm>
           <a:prstGeom prst="roundRect">
@@ -4174,7 +4174,7 @@
         </p:nvSpPr>
         <p:spPr>
           <a:xfrm>
-            <a:off x="8961120" y="2331720"/>
+            <a:off x="7132320" y="2331720"/>
             <a:ext cx="1005840" cy="457200"/>
           </a:xfrm>
           <a:prstGeom prst="rect">
@@ -4213,7 +4213,7 @@
         </p:nvSpPr>
         <p:spPr>
           <a:xfrm>
-            <a:off x="10789920" y="2286000"/>
+            <a:off x="10515600" y="2286000"/>
             <a:ext cx="1005840" cy="502920"/>
           </a:xfrm>
           <a:prstGeom prst="roundRect">
@@ -4256,7 +4256,7 @@
         </p:nvSpPr>
         <p:spPr>
           <a:xfrm>
-            <a:off x="10789920" y="2331720"/>
+            <a:off x="10515600" y="2331720"/>
             <a:ext cx="1005840" cy="457200"/>
           </a:xfrm>
           <a:prstGeom prst="rect">

</xml_diff>